<commit_message>
Fresh version of slides from Roman.
</commit_message>
<xml_diff>
--- a/CppZeroCost/2025/Rusyaev/hardening_v1.pptx
+++ b/CppZeroCost/2025/Rusyaev/hardening_v1.pptx
@@ -4,6 +4,9 @@
   <p:sldMasterIdLst>
     <p:sldMasterId id="2147483648" r:id="rId1"/>
   </p:sldMasterIdLst>
+  <p:notesMasterIdLst>
+    <p:notesMasterId r:id="rId32"/>
+  </p:notesMasterIdLst>
   <p:sldIdLst>
     <p:sldId id="256" r:id="rId2"/>
     <p:sldId id="262" r:id="rId3"/>
@@ -17,22 +20,24 @@
     <p:sldId id="276" r:id="rId11"/>
     <p:sldId id="273" r:id="rId12"/>
     <p:sldId id="280" r:id="rId13"/>
-    <p:sldId id="281" r:id="rId14"/>
-    <p:sldId id="294" r:id="rId15"/>
-    <p:sldId id="268" r:id="rId16"/>
-    <p:sldId id="265" r:id="rId17"/>
-    <p:sldId id="284" r:id="rId18"/>
-    <p:sldId id="286" r:id="rId19"/>
-    <p:sldId id="292" r:id="rId20"/>
-    <p:sldId id="259" r:id="rId21"/>
-    <p:sldId id="289" r:id="rId22"/>
-    <p:sldId id="290" r:id="rId23"/>
-    <p:sldId id="283" r:id="rId24"/>
-    <p:sldId id="291" r:id="rId25"/>
-    <p:sldId id="279" r:id="rId26"/>
-    <p:sldId id="293" r:id="rId27"/>
-    <p:sldId id="282" r:id="rId28"/>
-    <p:sldId id="278" r:id="rId29"/>
+    <p:sldId id="294" r:id="rId14"/>
+    <p:sldId id="268" r:id="rId15"/>
+    <p:sldId id="265" r:id="rId16"/>
+    <p:sldId id="284" r:id="rId17"/>
+    <p:sldId id="286" r:id="rId18"/>
+    <p:sldId id="292" r:id="rId19"/>
+    <p:sldId id="287" r:id="rId20"/>
+    <p:sldId id="269" r:id="rId21"/>
+    <p:sldId id="259" r:id="rId22"/>
+    <p:sldId id="289" r:id="rId23"/>
+    <p:sldId id="290" r:id="rId24"/>
+    <p:sldId id="283" r:id="rId25"/>
+    <p:sldId id="291" r:id="rId26"/>
+    <p:sldId id="279" r:id="rId27"/>
+    <p:sldId id="293" r:id="rId28"/>
+    <p:sldId id="282" r:id="rId29"/>
+    <p:sldId id="278" r:id="rId30"/>
+    <p:sldId id="281" r:id="rId31"/>
   </p:sldIdLst>
   <p:sldSz cx="12192000" cy="6858000"/>
   <p:notesSz cx="6858000" cy="9144000"/>
@@ -139,6 +144,355 @@
 </p:presentation>
 </file>
 
+<file path=ppt/notesMasters/notesMaster1.xml><?xml version="1.0" encoding="utf-8"?>
+<p:notesMaster xmlns:a="http://schemas.openxmlformats.org/drawingml/2006/main" xmlns:r="http://schemas.openxmlformats.org/officeDocument/2006/relationships" xmlns:p="http://schemas.openxmlformats.org/presentationml/2006/main">
+  <p:cSld>
+    <p:bg>
+      <p:bgRef idx="1001">
+        <a:schemeClr val="bg1"/>
+      </p:bgRef>
+    </p:bg>
+    <p:spTree>
+      <p:nvGrpSpPr>
+        <p:cNvPr id="1" name=""/>
+        <p:cNvGrpSpPr/>
+        <p:nvPr/>
+      </p:nvGrpSpPr>
+      <p:grpSpPr>
+        <a:xfrm>
+          <a:off x="0" y="0"/>
+          <a:ext cx="0" cy="0"/>
+          <a:chOff x="0" y="0"/>
+          <a:chExt cx="0" cy="0"/>
+        </a:xfrm>
+      </p:grpSpPr>
+      <p:sp>
+        <p:nvSpPr>
+          <p:cNvPr id="2" name="Header Placeholder 1"/>
+          <p:cNvSpPr>
+            <a:spLocks noGrp="1"/>
+          </p:cNvSpPr>
+          <p:nvPr>
+            <p:ph type="hdr" sz="quarter"/>
+          </p:nvPr>
+        </p:nvSpPr>
+        <p:spPr>
+          <a:xfrm>
+            <a:off x="0" y="0"/>
+            <a:ext cx="2971800" cy="458788"/>
+          </a:xfrm>
+          <a:prstGeom prst="rect">
+            <a:avLst/>
+          </a:prstGeom>
+        </p:spPr>
+        <p:txBody>
+          <a:bodyPr vert="horz" lIns="91440" tIns="45720" rIns="91440" bIns="45720" rtlCol="0"/>
+          <a:lstStyle>
+            <a:lvl1pPr algn="l">
+              <a:defRPr sz="1200"/>
+            </a:lvl1pPr>
+          </a:lstStyle>
+          <a:p>
+            <a:endParaRPr lang="en-US"/>
+          </a:p>
+        </p:txBody>
+      </p:sp>
+      <p:sp>
+        <p:nvSpPr>
+          <p:cNvPr id="3" name="Date Placeholder 2"/>
+          <p:cNvSpPr>
+            <a:spLocks noGrp="1"/>
+          </p:cNvSpPr>
+          <p:nvPr>
+            <p:ph type="dt" idx="1"/>
+          </p:nvPr>
+        </p:nvSpPr>
+        <p:spPr>
+          <a:xfrm>
+            <a:off x="3884613" y="0"/>
+            <a:ext cx="2971800" cy="458788"/>
+          </a:xfrm>
+          <a:prstGeom prst="rect">
+            <a:avLst/>
+          </a:prstGeom>
+        </p:spPr>
+        <p:txBody>
+          <a:bodyPr vert="horz" lIns="91440" tIns="45720" rIns="91440" bIns="45720" rtlCol="0"/>
+          <a:lstStyle>
+            <a:lvl1pPr algn="r">
+              <a:defRPr sz="1200"/>
+            </a:lvl1pPr>
+          </a:lstStyle>
+          <a:p>
+            <a:fld id="{B3A181C1-6E97-4BE6-8215-A9B1FC52F0EE}" type="datetimeFigureOut">
+              <a:rPr lang="en-US" smtClean="0"/>
+              <a:t>7/22/2025</a:t>
+            </a:fld>
+            <a:endParaRPr lang="en-US"/>
+          </a:p>
+        </p:txBody>
+      </p:sp>
+      <p:sp>
+        <p:nvSpPr>
+          <p:cNvPr id="4" name="Slide Image Placeholder 3"/>
+          <p:cNvSpPr>
+            <a:spLocks noGrp="1" noRot="1" noChangeAspect="1"/>
+          </p:cNvSpPr>
+          <p:nvPr>
+            <p:ph type="sldImg" idx="2"/>
+          </p:nvPr>
+        </p:nvSpPr>
+        <p:spPr>
+          <a:xfrm>
+            <a:off x="685800" y="1143000"/>
+            <a:ext cx="5486400" cy="3086100"/>
+          </a:xfrm>
+          <a:prstGeom prst="rect">
+            <a:avLst/>
+          </a:prstGeom>
+          <a:noFill/>
+          <a:ln w="12700">
+            <a:solidFill>
+              <a:prstClr val="black"/>
+            </a:solidFill>
+          </a:ln>
+        </p:spPr>
+        <p:txBody>
+          <a:bodyPr vert="horz" lIns="91440" tIns="45720" rIns="91440" bIns="45720" rtlCol="0" anchor="ctr"/>
+          <a:lstStyle/>
+          <a:p>
+            <a:endParaRPr lang="en-US"/>
+          </a:p>
+        </p:txBody>
+      </p:sp>
+      <p:sp>
+        <p:nvSpPr>
+          <p:cNvPr id="5" name="Notes Placeholder 4"/>
+          <p:cNvSpPr>
+            <a:spLocks noGrp="1"/>
+          </p:cNvSpPr>
+          <p:nvPr>
+            <p:ph type="body" sz="quarter" idx="3"/>
+          </p:nvPr>
+        </p:nvSpPr>
+        <p:spPr>
+          <a:xfrm>
+            <a:off x="685800" y="4400550"/>
+            <a:ext cx="5486400" cy="3600450"/>
+          </a:xfrm>
+          <a:prstGeom prst="rect">
+            <a:avLst/>
+          </a:prstGeom>
+        </p:spPr>
+        <p:txBody>
+          <a:bodyPr vert="horz" lIns="91440" tIns="45720" rIns="91440" bIns="45720" rtlCol="0"/>
+          <a:lstStyle/>
+          <a:p>
+            <a:pPr lvl="0"/>
+            <a:r>
+              <a:rPr lang="en-US"/>
+              <a:t>Edit Master text styles</a:t>
+            </a:r>
+          </a:p>
+          <a:p>
+            <a:pPr lvl="1"/>
+            <a:r>
+              <a:rPr lang="en-US"/>
+              <a:t>Second level</a:t>
+            </a:r>
+          </a:p>
+          <a:p>
+            <a:pPr lvl="2"/>
+            <a:r>
+              <a:rPr lang="en-US"/>
+              <a:t>Third level</a:t>
+            </a:r>
+          </a:p>
+          <a:p>
+            <a:pPr lvl="3"/>
+            <a:r>
+              <a:rPr lang="en-US"/>
+              <a:t>Fourth level</a:t>
+            </a:r>
+          </a:p>
+          <a:p>
+            <a:pPr lvl="4"/>
+            <a:r>
+              <a:rPr lang="en-US"/>
+              <a:t>Fifth level</a:t>
+            </a:r>
+          </a:p>
+        </p:txBody>
+      </p:sp>
+      <p:sp>
+        <p:nvSpPr>
+          <p:cNvPr id="6" name="Footer Placeholder 5"/>
+          <p:cNvSpPr>
+            <a:spLocks noGrp="1"/>
+          </p:cNvSpPr>
+          <p:nvPr>
+            <p:ph type="ftr" sz="quarter" idx="4"/>
+          </p:nvPr>
+        </p:nvSpPr>
+        <p:spPr>
+          <a:xfrm>
+            <a:off x="0" y="8685213"/>
+            <a:ext cx="2971800" cy="458787"/>
+          </a:xfrm>
+          <a:prstGeom prst="rect">
+            <a:avLst/>
+          </a:prstGeom>
+        </p:spPr>
+        <p:txBody>
+          <a:bodyPr vert="horz" lIns="91440" tIns="45720" rIns="91440" bIns="45720" rtlCol="0" anchor="b"/>
+          <a:lstStyle>
+            <a:lvl1pPr algn="l">
+              <a:defRPr sz="1200"/>
+            </a:lvl1pPr>
+          </a:lstStyle>
+          <a:p>
+            <a:endParaRPr lang="en-US"/>
+          </a:p>
+        </p:txBody>
+      </p:sp>
+      <p:sp>
+        <p:nvSpPr>
+          <p:cNvPr id="7" name="Slide Number Placeholder 6"/>
+          <p:cNvSpPr>
+            <a:spLocks noGrp="1"/>
+          </p:cNvSpPr>
+          <p:nvPr>
+            <p:ph type="sldNum" sz="quarter" idx="5"/>
+          </p:nvPr>
+        </p:nvSpPr>
+        <p:spPr>
+          <a:xfrm>
+            <a:off x="3884613" y="8685213"/>
+            <a:ext cx="2971800" cy="458787"/>
+          </a:xfrm>
+          <a:prstGeom prst="rect">
+            <a:avLst/>
+          </a:prstGeom>
+        </p:spPr>
+        <p:txBody>
+          <a:bodyPr vert="horz" lIns="91440" tIns="45720" rIns="91440" bIns="45720" rtlCol="0" anchor="b"/>
+          <a:lstStyle>
+            <a:lvl1pPr algn="r">
+              <a:defRPr sz="1200"/>
+            </a:lvl1pPr>
+          </a:lstStyle>
+          <a:p>
+            <a:fld id="{00774AD8-008A-4FC5-8755-6BD36EA21534}" type="slidenum">
+              <a:rPr lang="en-US" smtClean="0"/>
+              <a:t>‹#›</a:t>
+            </a:fld>
+            <a:endParaRPr lang="en-US"/>
+          </a:p>
+        </p:txBody>
+      </p:sp>
+    </p:spTree>
+    <p:extLst>
+      <p:ext uri="{BB962C8B-B14F-4D97-AF65-F5344CB8AC3E}">
+        <p14:creationId xmlns:p14="http://schemas.microsoft.com/office/powerpoint/2010/main" val="1354814179"/>
+      </p:ext>
+    </p:extLst>
+  </p:cSld>
+  <p:clrMap bg1="lt1" tx1="dk1" bg2="lt2" tx2="dk2" accent1="accent1" accent2="accent2" accent3="accent3" accent4="accent4" accent5="accent5" accent6="accent6" hlink="hlink" folHlink="folHlink"/>
+  <p:notesStyle>
+    <a:lvl1pPr marL="0" algn="l" defTabSz="914400" rtl="0" eaLnBrk="1" latinLnBrk="0" hangingPunct="1">
+      <a:defRPr sz="1200" kern="1200">
+        <a:solidFill>
+          <a:schemeClr val="tx1"/>
+        </a:solidFill>
+        <a:latin typeface="+mn-lt"/>
+        <a:ea typeface="+mn-ea"/>
+        <a:cs typeface="+mn-cs"/>
+      </a:defRPr>
+    </a:lvl1pPr>
+    <a:lvl2pPr marL="457200" algn="l" defTabSz="914400" rtl="0" eaLnBrk="1" latinLnBrk="0" hangingPunct="1">
+      <a:defRPr sz="1200" kern="1200">
+        <a:solidFill>
+          <a:schemeClr val="tx1"/>
+        </a:solidFill>
+        <a:latin typeface="+mn-lt"/>
+        <a:ea typeface="+mn-ea"/>
+        <a:cs typeface="+mn-cs"/>
+      </a:defRPr>
+    </a:lvl2pPr>
+    <a:lvl3pPr marL="914400" algn="l" defTabSz="914400" rtl="0" eaLnBrk="1" latinLnBrk="0" hangingPunct="1">
+      <a:defRPr sz="1200" kern="1200">
+        <a:solidFill>
+          <a:schemeClr val="tx1"/>
+        </a:solidFill>
+        <a:latin typeface="+mn-lt"/>
+        <a:ea typeface="+mn-ea"/>
+        <a:cs typeface="+mn-cs"/>
+      </a:defRPr>
+    </a:lvl3pPr>
+    <a:lvl4pPr marL="1371600" algn="l" defTabSz="914400" rtl="0" eaLnBrk="1" latinLnBrk="0" hangingPunct="1">
+      <a:defRPr sz="1200" kern="1200">
+        <a:solidFill>
+          <a:schemeClr val="tx1"/>
+        </a:solidFill>
+        <a:latin typeface="+mn-lt"/>
+        <a:ea typeface="+mn-ea"/>
+        <a:cs typeface="+mn-cs"/>
+      </a:defRPr>
+    </a:lvl4pPr>
+    <a:lvl5pPr marL="1828800" algn="l" defTabSz="914400" rtl="0" eaLnBrk="1" latinLnBrk="0" hangingPunct="1">
+      <a:defRPr sz="1200" kern="1200">
+        <a:solidFill>
+          <a:schemeClr val="tx1"/>
+        </a:solidFill>
+        <a:latin typeface="+mn-lt"/>
+        <a:ea typeface="+mn-ea"/>
+        <a:cs typeface="+mn-cs"/>
+      </a:defRPr>
+    </a:lvl5pPr>
+    <a:lvl6pPr marL="2286000" algn="l" defTabSz="914400" rtl="0" eaLnBrk="1" latinLnBrk="0" hangingPunct="1">
+      <a:defRPr sz="1200" kern="1200">
+        <a:solidFill>
+          <a:schemeClr val="tx1"/>
+        </a:solidFill>
+        <a:latin typeface="+mn-lt"/>
+        <a:ea typeface="+mn-ea"/>
+        <a:cs typeface="+mn-cs"/>
+      </a:defRPr>
+    </a:lvl6pPr>
+    <a:lvl7pPr marL="2743200" algn="l" defTabSz="914400" rtl="0" eaLnBrk="1" latinLnBrk="0" hangingPunct="1">
+      <a:defRPr sz="1200" kern="1200">
+        <a:solidFill>
+          <a:schemeClr val="tx1"/>
+        </a:solidFill>
+        <a:latin typeface="+mn-lt"/>
+        <a:ea typeface="+mn-ea"/>
+        <a:cs typeface="+mn-cs"/>
+      </a:defRPr>
+    </a:lvl7pPr>
+    <a:lvl8pPr marL="3200400" algn="l" defTabSz="914400" rtl="0" eaLnBrk="1" latinLnBrk="0" hangingPunct="1">
+      <a:defRPr sz="1200" kern="1200">
+        <a:solidFill>
+          <a:schemeClr val="tx1"/>
+        </a:solidFill>
+        <a:latin typeface="+mn-lt"/>
+        <a:ea typeface="+mn-ea"/>
+        <a:cs typeface="+mn-cs"/>
+      </a:defRPr>
+    </a:lvl8pPr>
+    <a:lvl9pPr marL="3657600" algn="l" defTabSz="914400" rtl="0" eaLnBrk="1" latinLnBrk="0" hangingPunct="1">
+      <a:defRPr sz="1200" kern="1200">
+        <a:solidFill>
+          <a:schemeClr val="tx1"/>
+        </a:solidFill>
+        <a:latin typeface="+mn-lt"/>
+        <a:ea typeface="+mn-ea"/>
+        <a:cs typeface="+mn-cs"/>
+      </a:defRPr>
+    </a:lvl9pPr>
+  </p:notesStyle>
+</p:notesMaster>
+</file>
+
 <file path=ppt/slideLayouts/slideLayout1.xml><?xml version="1.0" encoding="utf-8"?>
 <p:sldLayout xmlns:a="http://schemas.openxmlformats.org/drawingml/2006/main" xmlns:r="http://schemas.openxmlformats.org/officeDocument/2006/relationships" xmlns:p="http://schemas.openxmlformats.org/presentationml/2006/main" type="title" preserve="1">
   <p:cSld name="Title Slide">
@@ -284,7 +638,7 @@
           <a:bodyPr/>
           <a:lstStyle/>
           <a:p>
-            <a:fld id="{250F8134-5D3F-40CD-B58A-AB699C6780D8}" type="datetimeFigureOut">
+            <a:fld id="{DB282448-DDD2-4853-893C-6DF82EB5924F}" type="datetime1">
               <a:rPr lang="en-US" smtClean="0"/>
               <a:t>7/22/2025</a:t>
             </a:fld>
@@ -482,7 +836,7 @@
           <a:bodyPr/>
           <a:lstStyle/>
           <a:p>
-            <a:fld id="{250F8134-5D3F-40CD-B58A-AB699C6780D8}" type="datetimeFigureOut">
+            <a:fld id="{DE0F2FBB-F13E-450A-90B5-B087370EF89A}" type="datetime1">
               <a:rPr lang="en-US" smtClean="0"/>
               <a:t>7/22/2025</a:t>
             </a:fld>
@@ -690,7 +1044,7 @@
           <a:bodyPr/>
           <a:lstStyle/>
           <a:p>
-            <a:fld id="{250F8134-5D3F-40CD-B58A-AB699C6780D8}" type="datetimeFigureOut">
+            <a:fld id="{4AE13B89-2241-4149-9A9A-9948DC822C43}" type="datetime1">
               <a:rPr lang="en-US" smtClean="0"/>
               <a:t>7/22/2025</a:t>
             </a:fld>
@@ -888,7 +1242,7 @@
           <a:bodyPr/>
           <a:lstStyle/>
           <a:p>
-            <a:fld id="{250F8134-5D3F-40CD-B58A-AB699C6780D8}" type="datetimeFigureOut">
+            <a:fld id="{676FB157-DFF9-4E1D-BAF0-003438369DA9}" type="datetime1">
               <a:rPr lang="en-US" smtClean="0"/>
               <a:t>7/22/2025</a:t>
             </a:fld>
@@ -1163,7 +1517,7 @@
           <a:bodyPr/>
           <a:lstStyle/>
           <a:p>
-            <a:fld id="{250F8134-5D3F-40CD-B58A-AB699C6780D8}" type="datetimeFigureOut">
+            <a:fld id="{1FE30C9E-D8EA-4B53-A78F-B3F8A97EC057}" type="datetime1">
               <a:rPr lang="en-US" smtClean="0"/>
               <a:t>7/22/2025</a:t>
             </a:fld>
@@ -1428,7 +1782,7 @@
           <a:bodyPr/>
           <a:lstStyle/>
           <a:p>
-            <a:fld id="{250F8134-5D3F-40CD-B58A-AB699C6780D8}" type="datetimeFigureOut">
+            <a:fld id="{FF351BE1-8762-4087-9829-B6EBFD091377}" type="datetime1">
               <a:rPr lang="en-US" smtClean="0"/>
               <a:t>7/22/2025</a:t>
             </a:fld>
@@ -1840,7 +2194,7 @@
           <a:bodyPr/>
           <a:lstStyle/>
           <a:p>
-            <a:fld id="{250F8134-5D3F-40CD-B58A-AB699C6780D8}" type="datetimeFigureOut">
+            <a:fld id="{211FB94F-0E9D-4075-8061-677D93761C98}" type="datetime1">
               <a:rPr lang="en-US" smtClean="0"/>
               <a:t>7/22/2025</a:t>
             </a:fld>
@@ -1981,7 +2335,7 @@
           <a:bodyPr/>
           <a:lstStyle/>
           <a:p>
-            <a:fld id="{250F8134-5D3F-40CD-B58A-AB699C6780D8}" type="datetimeFigureOut">
+            <a:fld id="{5820D910-2677-418A-92CB-602EEA440209}" type="datetime1">
               <a:rPr lang="en-US" smtClean="0"/>
               <a:t>7/22/2025</a:t>
             </a:fld>
@@ -2094,7 +2448,7 @@
           <a:bodyPr/>
           <a:lstStyle/>
           <a:p>
-            <a:fld id="{250F8134-5D3F-40CD-B58A-AB699C6780D8}" type="datetimeFigureOut">
+            <a:fld id="{78991DED-696E-498A-AB42-E18174F7D44D}" type="datetime1">
               <a:rPr lang="en-US" smtClean="0"/>
               <a:t>7/22/2025</a:t>
             </a:fld>
@@ -2405,7 +2759,7 @@
           <a:bodyPr/>
           <a:lstStyle/>
           <a:p>
-            <a:fld id="{250F8134-5D3F-40CD-B58A-AB699C6780D8}" type="datetimeFigureOut">
+            <a:fld id="{FB6FEAC6-B1CA-4E34-BA79-4D6D3896D8ED}" type="datetime1">
               <a:rPr lang="en-US" smtClean="0"/>
               <a:t>7/22/2025</a:t>
             </a:fld>
@@ -2693,7 +3047,7 @@
           <a:bodyPr/>
           <a:lstStyle/>
           <a:p>
-            <a:fld id="{250F8134-5D3F-40CD-B58A-AB699C6780D8}" type="datetimeFigureOut">
+            <a:fld id="{EA9D6606-8E3E-4CA6-A816-AFCD0B734DA0}" type="datetime1">
               <a:rPr lang="en-US" smtClean="0"/>
               <a:t>7/22/2025</a:t>
             </a:fld>
@@ -2934,7 +3288,7 @@
             </a:lvl1pPr>
           </a:lstStyle>
           <a:p>
-            <a:fld id="{250F8134-5D3F-40CD-B58A-AB699C6780D8}" type="datetimeFigureOut">
+            <a:fld id="{04545AAF-DF3E-4239-9B6E-980D1D6A0D6E}" type="datetime1">
               <a:rPr lang="en-US" smtClean="0"/>
               <a:t>7/22/2025</a:t>
             </a:fld>
@@ -3053,6 +3407,7 @@
     <p:sldLayoutId id="2147483658" r:id="rId10"/>
     <p:sldLayoutId id="2147483659" r:id="rId11"/>
   </p:sldLayoutIdLst>
+  <p:hf hdr="0" ftr="0" dt="0"/>
   <p:txStyles>
     <p:titleStyle>
       <a:lvl1pPr algn="l" defTabSz="914400" rtl="0" eaLnBrk="1" latinLnBrk="0" hangingPunct="1">
@@ -3386,6 +3741,35 @@
           </a:p>
         </p:txBody>
       </p:sp>
+      <p:sp>
+        <p:nvSpPr>
+          <p:cNvPr id="3" name="Slide Number Placeholder 2">
+            <a:extLst>
+              <a:ext uri="{FF2B5EF4-FFF2-40B4-BE49-F238E27FC236}">
+                <a16:creationId xmlns:a16="http://schemas.microsoft.com/office/drawing/2014/main" id="{3FAB0E01-DF5D-429B-86B1-3BE831A0D9C9}"/>
+              </a:ext>
+            </a:extLst>
+          </p:cNvPr>
+          <p:cNvSpPr>
+            <a:spLocks noGrp="1"/>
+          </p:cNvSpPr>
+          <p:nvPr>
+            <p:ph type="sldNum" sz="quarter" idx="12"/>
+          </p:nvPr>
+        </p:nvSpPr>
+        <p:spPr/>
+        <p:txBody>
+          <a:bodyPr/>
+          <a:lstStyle/>
+          <a:p>
+            <a:fld id="{C4166A4A-BC63-4E3E-8737-A1316BCBB6DC}" type="slidenum">
+              <a:rPr lang="en-US" smtClean="0"/>
+              <a:t>1</a:t>
+            </a:fld>
+            <a:endParaRPr lang="en-US"/>
+          </a:p>
+        </p:txBody>
+      </p:sp>
     </p:spTree>
     <p:extLst>
       <p:ext uri="{BB962C8B-B14F-4D97-AF65-F5344CB8AC3E}">
@@ -3468,18 +3852,65 @@
           <a:p>
             <a:r>
               <a:rPr lang="ru-RU" dirty="0"/>
-              <a:t>Примеры</a:t>
+              <a:t>Включение </a:t>
             </a:r>
             <a:r>
               <a:rPr lang="en-US" dirty="0"/>
-              <a:t>:</a:t>
-            </a:r>
-          </a:p>
-          <a:p>
-            <a:pPr lvl="1"/>
+              <a:t>ASLR (-</a:t>
+            </a:r>
+            <a:r>
+              <a:rPr lang="en-US" dirty="0" err="1"/>
+              <a:t>fPIE</a:t>
+            </a:r>
             <a:r>
               <a:rPr lang="en-US" dirty="0"/>
-              <a:t>Minimal </a:t>
+              <a:t>)</a:t>
+            </a:r>
+          </a:p>
+          <a:p>
+            <a:r>
+              <a:rPr lang="ru-RU" dirty="0"/>
+              <a:t>Включение </a:t>
+            </a:r>
+            <a:r>
+              <a:rPr lang="en-US" dirty="0"/>
+              <a:t>stack protector (-</a:t>
+            </a:r>
+            <a:r>
+              <a:rPr lang="en-US" dirty="0" err="1"/>
+              <a:t>fstack</a:t>
+            </a:r>
+            <a:r>
+              <a:rPr lang="en-US" dirty="0"/>
+              <a:t>-protector / -</a:t>
+            </a:r>
+            <a:r>
+              <a:rPr lang="en-US" dirty="0" err="1"/>
+              <a:t>fstack</a:t>
+            </a:r>
+            <a:r>
+              <a:rPr lang="en-US" dirty="0"/>
+              <a:t>-protector-strong)</a:t>
+            </a:r>
+          </a:p>
+          <a:p>
+            <a:r>
+              <a:rPr lang="ru-RU" dirty="0"/>
+              <a:t>Включение фортификации (-</a:t>
+            </a:r>
+            <a:r>
+              <a:rPr lang="en-US" dirty="0"/>
+              <a:t>D_FORTIFY_SOURCE=3)</a:t>
+            </a:r>
+          </a:p>
+          <a:p>
+            <a:r>
+              <a:rPr lang="ru-RU" dirty="0"/>
+              <a:t>Использование </a:t>
+            </a:r>
+            <a:r>
+              <a:rPr lang="en-US" dirty="0"/>
+              <a:t>minimal </a:t>
             </a:r>
             <a:r>
               <a:rPr lang="en-US" dirty="0" err="1"/>
@@ -3507,52 +3938,39 @@
             </a:r>
           </a:p>
           <a:p>
-            <a:pPr lvl="1"/>
-            <a:r>
-              <a:rPr lang="en-US" dirty="0"/>
-              <a:t>Stack protector (-</a:t>
-            </a:r>
-            <a:r>
-              <a:rPr lang="en-US" dirty="0" err="1"/>
-              <a:t>fstack</a:t>
-            </a:r>
-            <a:r>
-              <a:rPr lang="en-US" dirty="0"/>
-              <a:t>-protector / -</a:t>
-            </a:r>
-            <a:r>
-              <a:rPr lang="en-US" dirty="0" err="1"/>
-              <a:t>fstack</a:t>
-            </a:r>
-            <a:r>
-              <a:rPr lang="en-US" dirty="0"/>
-              <a:t>-protector-strong)</a:t>
-            </a:r>
-          </a:p>
-          <a:p>
-            <a:pPr lvl="1"/>
-            <a:r>
-              <a:rPr lang="ru-RU" dirty="0"/>
-              <a:t>Фортификации (-</a:t>
-            </a:r>
-            <a:r>
-              <a:rPr lang="en-US" dirty="0"/>
-              <a:t>D_FORTIFY_SOURCE=3)</a:t>
-            </a:r>
-          </a:p>
-          <a:p>
-            <a:pPr lvl="1"/>
             <a:r>
               <a:rPr lang="en-US" dirty="0"/>
               <a:t>Etc.</a:t>
             </a:r>
           </a:p>
-          <a:p>
-            <a:r>
-              <a:rPr lang="ru-RU" dirty="0"/>
-              <a:t>Подробности ниже</a:t>
-            </a:r>
-            <a:endParaRPr lang="en-US" dirty="0"/>
+        </p:txBody>
+      </p:sp>
+      <p:sp>
+        <p:nvSpPr>
+          <p:cNvPr id="4" name="Slide Number Placeholder 3">
+            <a:extLst>
+              <a:ext uri="{FF2B5EF4-FFF2-40B4-BE49-F238E27FC236}">
+                <a16:creationId xmlns:a16="http://schemas.microsoft.com/office/drawing/2014/main" id="{5651CB02-D441-4FCA-A398-AC78C60933B7}"/>
+              </a:ext>
+            </a:extLst>
+          </p:cNvPr>
+          <p:cNvSpPr>
+            <a:spLocks noGrp="1"/>
+          </p:cNvSpPr>
+          <p:nvPr>
+            <p:ph type="sldNum" sz="quarter" idx="12"/>
+          </p:nvPr>
+        </p:nvSpPr>
+        <p:spPr/>
+        <p:txBody>
+          <a:bodyPr/>
+          <a:lstStyle/>
+          <a:p>
+            <a:fld id="{C4166A4A-BC63-4E3E-8737-A1316BCBB6DC}" type="slidenum">
+              <a:rPr lang="en-US" smtClean="0"/>
+              <a:t>10</a:t>
+            </a:fld>
+            <a:endParaRPr lang="en-US"/>
           </a:p>
         </p:txBody>
       </p:sp>
@@ -3706,8 +4124,8 @@
         </p:nvSpPr>
         <p:spPr>
           <a:xfrm>
-            <a:off x="7538041" y="3558989"/>
-            <a:ext cx="2499919" cy="578754"/>
+            <a:off x="7538041" y="3523377"/>
+            <a:ext cx="2499919" cy="614366"/>
           </a:xfrm>
           <a:prstGeom prst="rect">
             <a:avLst/>
@@ -3740,6 +4158,35 @@
           <a:lstStyle/>
           <a:p>
             <a:pPr algn="ctr"/>
+            <a:endParaRPr lang="en-US"/>
+          </a:p>
+        </p:txBody>
+      </p:sp>
+      <p:sp>
+        <p:nvSpPr>
+          <p:cNvPr id="6" name="Slide Number Placeholder 5">
+            <a:extLst>
+              <a:ext uri="{FF2B5EF4-FFF2-40B4-BE49-F238E27FC236}">
+                <a16:creationId xmlns:a16="http://schemas.microsoft.com/office/drawing/2014/main" id="{55A77B81-D126-4947-B2B4-B78660C4D2FD}"/>
+              </a:ext>
+            </a:extLst>
+          </p:cNvPr>
+          <p:cNvSpPr>
+            <a:spLocks noGrp="1"/>
+          </p:cNvSpPr>
+          <p:nvPr>
+            <p:ph type="sldNum" sz="quarter" idx="12"/>
+          </p:nvPr>
+        </p:nvSpPr>
+        <p:spPr/>
+        <p:txBody>
+          <a:bodyPr/>
+          <a:lstStyle/>
+          <a:p>
+            <a:fld id="{C4166A4A-BC63-4E3E-8737-A1316BCBB6DC}" type="slidenum">
+              <a:rPr lang="en-US" smtClean="0"/>
+              <a:t>11</a:t>
+            </a:fld>
             <a:endParaRPr lang="en-US"/>
           </a:p>
         </p:txBody>
@@ -3835,15 +4282,7 @@
           <a:p>
             <a:r>
               <a:rPr lang="ru-RU" dirty="0"/>
-              <a:t>Высокая точность</a:t>
-            </a:r>
-            <a:endParaRPr lang="en-US" dirty="0"/>
-          </a:p>
-          <a:p>
-            <a:pPr lvl="1"/>
-            <a:r>
-              <a:rPr lang="ru-RU" dirty="0"/>
-              <a:t>Отсутствие </a:t>
+              <a:t>Высокая точность – отсутствие </a:t>
             </a:r>
             <a:r>
               <a:rPr lang="en-US" dirty="0"/>
@@ -3874,6 +4313,35 @@
               <a:t>Простота использования (флаг командной строки)</a:t>
             </a:r>
             <a:endParaRPr lang="en-US" dirty="0"/>
+          </a:p>
+        </p:txBody>
+      </p:sp>
+      <p:sp>
+        <p:nvSpPr>
+          <p:cNvPr id="4" name="Slide Number Placeholder 3">
+            <a:extLst>
+              <a:ext uri="{FF2B5EF4-FFF2-40B4-BE49-F238E27FC236}">
+                <a16:creationId xmlns:a16="http://schemas.microsoft.com/office/drawing/2014/main" id="{E2C83266-72F5-4887-8CC3-088ADDE8E327}"/>
+              </a:ext>
+            </a:extLst>
+          </p:cNvPr>
+          <p:cNvSpPr>
+            <a:spLocks noGrp="1"/>
+          </p:cNvSpPr>
+          <p:nvPr>
+            <p:ph type="sldNum" sz="quarter" idx="12"/>
+          </p:nvPr>
+        </p:nvSpPr>
+        <p:spPr/>
+        <p:txBody>
+          <a:bodyPr/>
+          <a:lstStyle/>
+          <a:p>
+            <a:fld id="{C4166A4A-BC63-4E3E-8737-A1316BCBB6DC}" type="slidenum">
+              <a:rPr lang="en-US" smtClean="0"/>
+              <a:t>12</a:t>
+            </a:fld>
+            <a:endParaRPr lang="en-US"/>
           </a:p>
         </p:txBody>
       </p:sp>
@@ -3912,152 +4380,6 @@
           <p:cNvPr id="2" name="Title 1">
             <a:extLst>
               <a:ext uri="{FF2B5EF4-FFF2-40B4-BE49-F238E27FC236}">
-                <a16:creationId xmlns:a16="http://schemas.microsoft.com/office/drawing/2014/main" id="{76D95E12-9E9C-443F-8963-97370016A706}"/>
-              </a:ext>
-            </a:extLst>
-          </p:cNvPr>
-          <p:cNvSpPr>
-            <a:spLocks noGrp="1"/>
-          </p:cNvSpPr>
-          <p:nvPr>
-            <p:ph type="title"/>
-          </p:nvPr>
-        </p:nvSpPr>
-        <p:spPr/>
-        <p:txBody>
-          <a:bodyPr/>
-          <a:lstStyle/>
-          <a:p>
-            <a:r>
-              <a:rPr lang="ru-RU" dirty="0"/>
-              <a:t>Что включать у себя?</a:t>
-            </a:r>
-            <a:endParaRPr lang="en-US" dirty="0"/>
-          </a:p>
-        </p:txBody>
-      </p:sp>
-      <p:sp>
-        <p:nvSpPr>
-          <p:cNvPr id="3" name="Content Placeholder 2">
-            <a:extLst>
-              <a:ext uri="{FF2B5EF4-FFF2-40B4-BE49-F238E27FC236}">
-                <a16:creationId xmlns:a16="http://schemas.microsoft.com/office/drawing/2014/main" id="{DCF3428E-C04D-4DE8-A4B8-60C5E7203274}"/>
-              </a:ext>
-            </a:extLst>
-          </p:cNvPr>
-          <p:cNvSpPr>
-            <a:spLocks noGrp="1"/>
-          </p:cNvSpPr>
-          <p:nvPr>
-            <p:ph idx="1"/>
-          </p:nvPr>
-        </p:nvSpPr>
-        <p:spPr/>
-        <p:txBody>
-          <a:bodyPr/>
-          <a:lstStyle/>
-          <a:p>
-            <a:r>
-              <a:rPr lang="en-US" dirty="0"/>
-              <a:t>ASLR (-</a:t>
-            </a:r>
-            <a:r>
-              <a:rPr lang="en-US" dirty="0" err="1"/>
-              <a:t>fpie</a:t>
-            </a:r>
-            <a:r>
-              <a:rPr lang="en-US" dirty="0"/>
-              <a:t>)</a:t>
-            </a:r>
-            <a:endParaRPr lang="ru-RU" dirty="0"/>
-          </a:p>
-          <a:p>
-            <a:r>
-              <a:rPr lang="en-US" dirty="0"/>
-              <a:t>Stack Protector (-</a:t>
-            </a:r>
-            <a:r>
-              <a:rPr lang="en-US" dirty="0" err="1"/>
-              <a:t>fstack</a:t>
-            </a:r>
-            <a:r>
-              <a:rPr lang="en-US" dirty="0"/>
-              <a:t>-protector-strong)</a:t>
-            </a:r>
-          </a:p>
-          <a:p>
-            <a:r>
-              <a:rPr lang="ru-RU" dirty="0"/>
-              <a:t>Фортификация (-</a:t>
-            </a:r>
-            <a:r>
-              <a:rPr lang="en-US" dirty="0"/>
-              <a:t>D_FORTIFY_SOURCE=3)</a:t>
-            </a:r>
-          </a:p>
-          <a:p>
-            <a:r>
-              <a:rPr lang="ru-RU" dirty="0"/>
-              <a:t>Защита от </a:t>
-            </a:r>
-            <a:r>
-              <a:rPr lang="en-US" dirty="0"/>
-              <a:t>Stack Clash</a:t>
-            </a:r>
-            <a:r>
-              <a:rPr lang="ru-RU" dirty="0"/>
-              <a:t> </a:t>
-            </a:r>
-            <a:r>
-              <a:rPr lang="en-US" dirty="0"/>
-              <a:t>(-</a:t>
-            </a:r>
-            <a:r>
-              <a:rPr lang="en-US" dirty="0" err="1"/>
-              <a:t>fstack</a:t>
-            </a:r>
-            <a:r>
-              <a:rPr lang="en-US" dirty="0"/>
-              <a:t>-clash-protection)</a:t>
-            </a:r>
-          </a:p>
-        </p:txBody>
-      </p:sp>
-    </p:spTree>
-    <p:extLst>
-      <p:ext uri="{BB962C8B-B14F-4D97-AF65-F5344CB8AC3E}">
-        <p14:creationId xmlns:p14="http://schemas.microsoft.com/office/powerpoint/2010/main" val="345651356"/>
-      </p:ext>
-    </p:extLst>
-  </p:cSld>
-  <p:clrMapOvr>
-    <a:masterClrMapping/>
-  </p:clrMapOvr>
-</p:sld>
-</file>
-
-<file path=ppt/slides/slide14.xml><?xml version="1.0" encoding="utf-8"?>
-<p:sld xmlns:a="http://schemas.openxmlformats.org/drawingml/2006/main" xmlns:r="http://schemas.openxmlformats.org/officeDocument/2006/relationships" xmlns:p="http://schemas.openxmlformats.org/presentationml/2006/main">
-  <p:cSld>
-    <p:spTree>
-      <p:nvGrpSpPr>
-        <p:cNvPr id="1" name=""/>
-        <p:cNvGrpSpPr/>
-        <p:nvPr/>
-      </p:nvGrpSpPr>
-      <p:grpSpPr>
-        <a:xfrm>
-          <a:off x="0" y="0"/>
-          <a:ext cx="0" cy="0"/>
-          <a:chOff x="0" y="0"/>
-          <a:chExt cx="0" cy="0"/>
-        </a:xfrm>
-      </p:grpSpPr>
-      <p:sp>
-        <p:nvSpPr>
-          <p:cNvPr id="2" name="Title 1">
-            <a:extLst>
-              <a:ext uri="{FF2B5EF4-FFF2-40B4-BE49-F238E27FC236}">
                 <a16:creationId xmlns:a16="http://schemas.microsoft.com/office/drawing/2014/main" id="{59E12094-6FF5-4A08-AFAD-0E12438176D6}"/>
               </a:ext>
             </a:extLst>
@@ -4107,6 +4429,35 @@
           </a:p>
         </p:txBody>
       </p:sp>
+      <p:sp>
+        <p:nvSpPr>
+          <p:cNvPr id="4" name="Slide Number Placeholder 3">
+            <a:extLst>
+              <a:ext uri="{FF2B5EF4-FFF2-40B4-BE49-F238E27FC236}">
+                <a16:creationId xmlns:a16="http://schemas.microsoft.com/office/drawing/2014/main" id="{D294A047-21EA-4F00-8763-A84CE28A2847}"/>
+              </a:ext>
+            </a:extLst>
+          </p:cNvPr>
+          <p:cNvSpPr>
+            <a:spLocks noGrp="1"/>
+          </p:cNvSpPr>
+          <p:nvPr>
+            <p:ph type="sldNum" sz="quarter" idx="12"/>
+          </p:nvPr>
+        </p:nvSpPr>
+        <p:spPr/>
+        <p:txBody>
+          <a:bodyPr/>
+          <a:lstStyle/>
+          <a:p>
+            <a:fld id="{C4166A4A-BC63-4E3E-8737-A1316BCBB6DC}" type="slidenum">
+              <a:rPr lang="en-US" smtClean="0"/>
+              <a:t>13</a:t>
+            </a:fld>
+            <a:endParaRPr lang="en-US"/>
+          </a:p>
+        </p:txBody>
+      </p:sp>
     </p:spTree>
     <p:extLst>
       <p:ext uri="{BB962C8B-B14F-4D97-AF65-F5344CB8AC3E}">
@@ -4120,7 +4471,7 @@
 </p:sld>
 </file>
 
-<file path=ppt/slides/slide15.xml><?xml version="1.0" encoding="utf-8"?>
+<file path=ppt/slides/slide14.xml><?xml version="1.0" encoding="utf-8"?>
 <p:sld xmlns:a="http://schemas.openxmlformats.org/drawingml/2006/main" xmlns:r="http://schemas.openxmlformats.org/officeDocument/2006/relationships" xmlns:p="http://schemas.openxmlformats.org/presentationml/2006/main">
   <p:cSld>
     <p:spTree>
@@ -4176,6 +4527,35 @@
           </a:p>
         </p:txBody>
       </p:sp>
+      <p:sp>
+        <p:nvSpPr>
+          <p:cNvPr id="3" name="Slide Number Placeholder 2">
+            <a:extLst>
+              <a:ext uri="{FF2B5EF4-FFF2-40B4-BE49-F238E27FC236}">
+                <a16:creationId xmlns:a16="http://schemas.microsoft.com/office/drawing/2014/main" id="{252BD33F-A85A-4FEF-AD4C-87CC02597E13}"/>
+              </a:ext>
+            </a:extLst>
+          </p:cNvPr>
+          <p:cNvSpPr>
+            <a:spLocks noGrp="1"/>
+          </p:cNvSpPr>
+          <p:nvPr>
+            <p:ph type="sldNum" sz="quarter" idx="12"/>
+          </p:nvPr>
+        </p:nvSpPr>
+        <p:spPr/>
+        <p:txBody>
+          <a:bodyPr/>
+          <a:lstStyle/>
+          <a:p>
+            <a:fld id="{C4166A4A-BC63-4E3E-8737-A1316BCBB6DC}" type="slidenum">
+              <a:rPr lang="en-US" smtClean="0"/>
+              <a:t>14</a:t>
+            </a:fld>
+            <a:endParaRPr lang="en-US"/>
+          </a:p>
+        </p:txBody>
+      </p:sp>
     </p:spTree>
     <p:extLst>
       <p:ext uri="{BB962C8B-B14F-4D97-AF65-F5344CB8AC3E}">
@@ -4189,8 +4569,8 @@
 </p:sld>
 </file>
 
-<file path=ppt/slides/slide16.xml><?xml version="1.0" encoding="utf-8"?>
-<p:sld xmlns:a="http://schemas.openxmlformats.org/drawingml/2006/main" xmlns:r="http://schemas.openxmlformats.org/officeDocument/2006/relationships" xmlns:p="http://schemas.openxmlformats.org/presentationml/2006/main">
+<file path=ppt/slides/slide15.xml><?xml version="1.0" encoding="utf-8"?>
+<p:sld xmlns:a="http://schemas.openxmlformats.org/drawingml/2006/main" xmlns:r="http://schemas.openxmlformats.org/officeDocument/2006/relationships" xmlns:p="http://schemas.openxmlformats.org/presentationml/2006/main" show="0">
   <p:cSld>
     <p:spTree>
       <p:nvGrpSpPr>
@@ -4258,7 +4638,7 @@
           <a:p>
             <a:r>
               <a:rPr lang="ru-RU" dirty="0"/>
-              <a:t>При включенном макросе </a:t>
+              <a:t>При включенном </a:t>
             </a:r>
             <a:r>
               <a:rPr lang="en-US" dirty="0"/>
@@ -4266,11 +4646,11 @@
             </a:r>
             <a:r>
               <a:rPr lang="ru-RU" dirty="0"/>
-              <a:t> библиотечные функции вызывают встроенные функции компилятора</a:t>
+              <a:t> функции вызывают встроенные функции компилятора </a:t>
             </a:r>
             <a:r>
               <a:rPr lang="en-US" dirty="0"/>
-              <a:t> (</a:t>
+              <a:t>(</a:t>
             </a:r>
             <a:r>
               <a:rPr lang="en-US" dirty="0" err="1"/>
@@ -4292,7 +4672,7 @@
             </a:r>
             <a:r>
               <a:rPr lang="ru-RU" dirty="0"/>
-              <a:t>раскрываются в</a:t>
+              <a:t>раскрываются</a:t>
             </a:r>
             <a:endParaRPr lang="en-US" dirty="0"/>
           </a:p>
@@ -4300,7 +4680,7 @@
             <a:pPr lvl="1"/>
             <a:r>
               <a:rPr lang="ru-RU" dirty="0"/>
-              <a:t>Обычные функции</a:t>
+              <a:t>В обычные функции</a:t>
             </a:r>
           </a:p>
           <a:p>
@@ -4314,7 +4694,7 @@
             <a:pPr lvl="2"/>
             <a:r>
               <a:rPr lang="ru-RU" dirty="0"/>
-              <a:t>либо известно, что рамзер </a:t>
+              <a:t>либо известно, что размер </a:t>
             </a:r>
             <a:r>
               <a:rPr lang="en-US" dirty="0" err="1"/>
@@ -4322,11 +4702,11 @@
             </a:r>
             <a:r>
               <a:rPr lang="en-US" dirty="0"/>
-              <a:t> &lt;= </a:t>
+              <a:t> &lt;=</a:t>
             </a:r>
             <a:r>
               <a:rPr lang="ru-RU" dirty="0"/>
-              <a:t>рамзеру </a:t>
+              <a:t> </a:t>
             </a:r>
             <a:r>
               <a:rPr lang="en-US" dirty="0" err="1"/>
@@ -4338,7 +4718,7 @@
             <a:pPr lvl="1"/>
             <a:r>
               <a:rPr lang="ru-RU" dirty="0"/>
-              <a:t>Специальные </a:t>
+              <a:t>В </a:t>
             </a:r>
             <a:r>
               <a:rPr lang="en-US" dirty="0"/>
@@ -4357,6 +4737,35 @@
               <a:t>версии, которые динамически проверяют размер объекта</a:t>
             </a:r>
             <a:endParaRPr lang="en-US" dirty="0"/>
+          </a:p>
+        </p:txBody>
+      </p:sp>
+      <p:sp>
+        <p:nvSpPr>
+          <p:cNvPr id="4" name="Slide Number Placeholder 3">
+            <a:extLst>
+              <a:ext uri="{FF2B5EF4-FFF2-40B4-BE49-F238E27FC236}">
+                <a16:creationId xmlns:a16="http://schemas.microsoft.com/office/drawing/2014/main" id="{2337A267-7909-4D55-87D2-21B747BDB672}"/>
+              </a:ext>
+            </a:extLst>
+          </p:cNvPr>
+          <p:cNvSpPr>
+            <a:spLocks noGrp="1"/>
+          </p:cNvSpPr>
+          <p:nvPr>
+            <p:ph type="sldNum" sz="quarter" idx="12"/>
+          </p:nvPr>
+        </p:nvSpPr>
+        <p:spPr/>
+        <p:txBody>
+          <a:bodyPr/>
+          <a:lstStyle/>
+          <a:p>
+            <a:fld id="{C4166A4A-BC63-4E3E-8737-A1316BCBB6DC}" type="slidenum">
+              <a:rPr lang="en-US" smtClean="0"/>
+              <a:t>15</a:t>
+            </a:fld>
+            <a:endParaRPr lang="en-US"/>
           </a:p>
         </p:txBody>
       </p:sp>
@@ -4373,7 +4782,7 @@
 </p:sld>
 </file>
 
-<file path=ppt/slides/slide17.xml><?xml version="1.0" encoding="utf-8"?>
+<file path=ppt/slides/slide16.xml><?xml version="1.0" encoding="utf-8"?>
 <p:sld xmlns:a="http://schemas.openxmlformats.org/drawingml/2006/main" xmlns:r="http://schemas.openxmlformats.org/officeDocument/2006/relationships" xmlns:p="http://schemas.openxmlformats.org/presentationml/2006/main">
   <p:cSld>
     <p:spTree>
@@ -5188,6 +5597,35 @@
           </a:p>
         </p:txBody>
       </p:sp>
+      <p:sp>
+        <p:nvSpPr>
+          <p:cNvPr id="4" name="Slide Number Placeholder 3">
+            <a:extLst>
+              <a:ext uri="{FF2B5EF4-FFF2-40B4-BE49-F238E27FC236}">
+                <a16:creationId xmlns:a16="http://schemas.microsoft.com/office/drawing/2014/main" id="{ED58DA74-C47B-4977-AC7C-01C9D0EF5D38}"/>
+              </a:ext>
+            </a:extLst>
+          </p:cNvPr>
+          <p:cNvSpPr>
+            <a:spLocks noGrp="1"/>
+          </p:cNvSpPr>
+          <p:nvPr>
+            <p:ph type="sldNum" sz="quarter" idx="12"/>
+          </p:nvPr>
+        </p:nvSpPr>
+        <p:spPr/>
+        <p:txBody>
+          <a:bodyPr/>
+          <a:lstStyle/>
+          <a:p>
+            <a:fld id="{C4166A4A-BC63-4E3E-8737-A1316BCBB6DC}" type="slidenum">
+              <a:rPr lang="en-US" smtClean="0"/>
+              <a:t>16</a:t>
+            </a:fld>
+            <a:endParaRPr lang="en-US"/>
+          </a:p>
+        </p:txBody>
+      </p:sp>
     </p:spTree>
     <p:extLst>
       <p:ext uri="{BB962C8B-B14F-4D97-AF65-F5344CB8AC3E}">
@@ -5201,7 +5639,7 @@
 </p:sld>
 </file>
 
-<file path=ppt/slides/slide18.xml><?xml version="1.0" encoding="utf-8"?>
+<file path=ppt/slides/slide17.xml><?xml version="1.0" encoding="utf-8"?>
 <p:sld xmlns:a="http://schemas.openxmlformats.org/drawingml/2006/main" xmlns:r="http://schemas.openxmlformats.org/officeDocument/2006/relationships" xmlns:p="http://schemas.openxmlformats.org/presentationml/2006/main">
   <p:cSld>
     <p:spTree>
@@ -7592,6 +8030,35 @@
           </a:p>
         </p:txBody>
       </p:sp>
+      <p:sp>
+        <p:nvSpPr>
+          <p:cNvPr id="3" name="Slide Number Placeholder 2">
+            <a:extLst>
+              <a:ext uri="{FF2B5EF4-FFF2-40B4-BE49-F238E27FC236}">
+                <a16:creationId xmlns:a16="http://schemas.microsoft.com/office/drawing/2014/main" id="{FB02189A-2BBC-4837-BF67-FC3CF0E2ED54}"/>
+              </a:ext>
+            </a:extLst>
+          </p:cNvPr>
+          <p:cNvSpPr>
+            <a:spLocks noGrp="1"/>
+          </p:cNvSpPr>
+          <p:nvPr>
+            <p:ph type="sldNum" sz="quarter" idx="12"/>
+          </p:nvPr>
+        </p:nvSpPr>
+        <p:spPr/>
+        <p:txBody>
+          <a:bodyPr/>
+          <a:lstStyle/>
+          <a:p>
+            <a:fld id="{C4166A4A-BC63-4E3E-8737-A1316BCBB6DC}" type="slidenum">
+              <a:rPr lang="en-US" smtClean="0"/>
+              <a:t>17</a:t>
+            </a:fld>
+            <a:endParaRPr lang="en-US"/>
+          </a:p>
+        </p:txBody>
+      </p:sp>
     </p:spTree>
     <p:extLst>
       <p:ext uri="{BB962C8B-B14F-4D97-AF65-F5344CB8AC3E}">
@@ -7605,7 +8072,7 @@
 </p:sld>
 </file>
 
-<file path=ppt/slides/slide19.xml><?xml version="1.0" encoding="utf-8"?>
+<file path=ppt/slides/slide18.xml><?xml version="1.0" encoding="utf-8"?>
 <p:sld xmlns:a="http://schemas.openxmlformats.org/drawingml/2006/main" xmlns:r="http://schemas.openxmlformats.org/officeDocument/2006/relationships" xmlns:p="http://schemas.openxmlformats.org/presentationml/2006/main">
   <p:cSld>
     <p:spTree>
@@ -8968,10 +9435,1529 @@
           </a:p>
         </p:txBody>
       </p:sp>
+      <p:sp>
+        <p:nvSpPr>
+          <p:cNvPr id="3" name="Slide Number Placeholder 2">
+            <a:extLst>
+              <a:ext uri="{FF2B5EF4-FFF2-40B4-BE49-F238E27FC236}">
+                <a16:creationId xmlns:a16="http://schemas.microsoft.com/office/drawing/2014/main" id="{E6738C83-CFE2-415D-ACEC-377ADC641535}"/>
+              </a:ext>
+            </a:extLst>
+          </p:cNvPr>
+          <p:cNvSpPr>
+            <a:spLocks noGrp="1"/>
+          </p:cNvSpPr>
+          <p:nvPr>
+            <p:ph type="sldNum" sz="quarter" idx="12"/>
+          </p:nvPr>
+        </p:nvSpPr>
+        <p:spPr/>
+        <p:txBody>
+          <a:bodyPr/>
+          <a:lstStyle/>
+          <a:p>
+            <a:fld id="{C4166A4A-BC63-4E3E-8737-A1316BCBB6DC}" type="slidenum">
+              <a:rPr lang="en-US" smtClean="0"/>
+              <a:t>18</a:t>
+            </a:fld>
+            <a:endParaRPr lang="en-US"/>
+          </a:p>
+        </p:txBody>
+      </p:sp>
     </p:spTree>
     <p:extLst>
       <p:ext uri="{BB962C8B-B14F-4D97-AF65-F5344CB8AC3E}">
         <p14:creationId xmlns:p14="http://schemas.microsoft.com/office/powerpoint/2010/main" val="320324951"/>
+      </p:ext>
+    </p:extLst>
+  </p:cSld>
+  <p:clrMapOvr>
+    <a:masterClrMapping/>
+  </p:clrMapOvr>
+</p:sld>
+</file>
+
+<file path=ppt/slides/slide19.xml><?xml version="1.0" encoding="utf-8"?>
+<p:sld xmlns:a="http://schemas.openxmlformats.org/drawingml/2006/main" xmlns:r="http://schemas.openxmlformats.org/officeDocument/2006/relationships" xmlns:p="http://schemas.openxmlformats.org/presentationml/2006/main">
+  <p:cSld>
+    <p:spTree>
+      <p:nvGrpSpPr>
+        <p:cNvPr id="1" name=""/>
+        <p:cNvGrpSpPr/>
+        <p:nvPr/>
+      </p:nvGrpSpPr>
+      <p:grpSpPr>
+        <a:xfrm>
+          <a:off x="0" y="0"/>
+          <a:ext cx="0" cy="0"/>
+          <a:chOff x="0" y="0"/>
+          <a:chExt cx="0" cy="0"/>
+        </a:xfrm>
+      </p:grpSpPr>
+      <p:sp>
+        <p:nvSpPr>
+          <p:cNvPr id="2" name="Title 1">
+            <a:extLst>
+              <a:ext uri="{FF2B5EF4-FFF2-40B4-BE49-F238E27FC236}">
+                <a16:creationId xmlns:a16="http://schemas.microsoft.com/office/drawing/2014/main" id="{B43801E5-4129-4B1A-A501-A7B74A82F098}"/>
+              </a:ext>
+            </a:extLst>
+          </p:cNvPr>
+          <p:cNvSpPr>
+            <a:spLocks noGrp="1"/>
+          </p:cNvSpPr>
+          <p:nvPr>
+            <p:ph type="title"/>
+          </p:nvPr>
+        </p:nvSpPr>
+        <p:spPr/>
+        <p:txBody>
+          <a:bodyPr/>
+          <a:lstStyle/>
+          <a:p>
+            <a:r>
+              <a:rPr lang="ru-RU" dirty="0"/>
+              <a:t>Артефакты фортификации</a:t>
+            </a:r>
+            <a:endParaRPr lang="en-US" dirty="0"/>
+          </a:p>
+        </p:txBody>
+      </p:sp>
+      <p:sp>
+        <p:nvSpPr>
+          <p:cNvPr id="5" name="Rectangle 2">
+            <a:extLst>
+              <a:ext uri="{FF2B5EF4-FFF2-40B4-BE49-F238E27FC236}">
+                <a16:creationId xmlns:a16="http://schemas.microsoft.com/office/drawing/2014/main" id="{994AEF75-6E81-4D8C-9501-3BE298BBF0FD}"/>
+              </a:ext>
+            </a:extLst>
+          </p:cNvPr>
+          <p:cNvSpPr>
+            <a:spLocks noChangeArrowheads="1"/>
+          </p:cNvSpPr>
+          <p:nvPr/>
+        </p:nvSpPr>
+        <p:spPr bwMode="auto">
+          <a:xfrm>
+            <a:off x="1450597" y="2054565"/>
+            <a:ext cx="3221373" cy="3693319"/>
+          </a:xfrm>
+          <a:prstGeom prst="rect">
+            <a:avLst/>
+          </a:prstGeom>
+          <a:solidFill>
+            <a:srgbClr val="FFFFFF"/>
+          </a:solidFill>
+          <a:ln>
+            <a:noFill/>
+          </a:ln>
+          <a:effectLst/>
+          <a:extLst>
+            <a:ext uri="{91240B29-F687-4F45-9708-019B960494DF}">
+              <a14:hiddenLine xmlns:a14="http://schemas.microsoft.com/office/drawing/2010/main" w="9525">
+                <a:solidFill>
+                  <a:schemeClr val="tx1"/>
+                </a:solidFill>
+                <a:miter lim="800000"/>
+                <a:headEnd/>
+                <a:tailEnd/>
+              </a14:hiddenLine>
+            </a:ext>
+            <a:ext uri="{AF507438-7753-43E0-B8FC-AC1667EBCBE1}">
+              <a14:hiddenEffects xmlns:a14="http://schemas.microsoft.com/office/drawing/2010/main">
+                <a:effectLst>
+                  <a:outerShdw dist="35921" dir="2700000" algn="ctr" rotWithShape="0">
+                    <a:schemeClr val="bg2"/>
+                  </a:outerShdw>
+                </a:effectLst>
+              </a14:hiddenEffects>
+            </a:ext>
+          </a:extLst>
+        </p:spPr>
+        <p:txBody>
+          <a:bodyPr vert="horz" wrap="square" lIns="91440" tIns="45720" rIns="91440" bIns="45720" numCol="1" anchor="ctr" anchorCtr="0" compatLnSpc="1">
+            <a:prstTxWarp prst="textNoShape">
+              <a:avLst/>
+            </a:prstTxWarp>
+            <a:spAutoFit/>
+          </a:bodyPr>
+          <a:lstStyle/>
+          <a:p>
+            <a:pPr marL="0" marR="0" lvl="0" indent="0" algn="l" defTabSz="914400" rtl="0" eaLnBrk="0" fontAlgn="base" latinLnBrk="0" hangingPunct="0">
+              <a:lnSpc>
+                <a:spcPct val="100000"/>
+              </a:lnSpc>
+              <a:spcBef>
+                <a:spcPct val="0"/>
+              </a:spcBef>
+              <a:spcAft>
+                <a:spcPct val="0"/>
+              </a:spcAft>
+              <a:buClrTx/>
+              <a:buSzTx/>
+              <a:buFontTx/>
+              <a:buNone/>
+              <a:tabLst/>
+            </a:pPr>
+            <a:r>
+              <a:rPr kumimoji="0" lang="en-US" altLang="en-US" b="0" i="0" u="none" strike="noStrike" cap="none" normalizeH="0" baseline="0" dirty="0">
+                <a:ln>
+                  <a:noFill/>
+                </a:ln>
+                <a:solidFill>
+                  <a:srgbClr val="0033B3"/>
+                </a:solidFill>
+                <a:effectLst/>
+                <a:latin typeface="JetBrains Mono"/>
+              </a:rPr>
+              <a:t>int </a:t>
+            </a:r>
+            <a:r>
+              <a:rPr kumimoji="0" lang="en-US" altLang="en-US" b="0" i="0" u="none" strike="noStrike" cap="none" normalizeH="0" baseline="0" dirty="0">
+                <a:ln>
+                  <a:noFill/>
+                </a:ln>
+                <a:solidFill>
+                  <a:srgbClr val="00627A"/>
+                </a:solidFill>
+                <a:effectLst/>
+                <a:latin typeface="JetBrains Mono"/>
+              </a:rPr>
+              <a:t>main</a:t>
+            </a:r>
+            <a:r>
+              <a:rPr kumimoji="0" lang="en-US" altLang="en-US" b="0" i="0" u="none" strike="noStrike" cap="none" normalizeH="0" baseline="0" dirty="0">
+                <a:ln>
+                  <a:noFill/>
+                </a:ln>
+                <a:solidFill>
+                  <a:srgbClr val="080808"/>
+                </a:solidFill>
+                <a:effectLst/>
+                <a:latin typeface="JetBrains Mono"/>
+              </a:rPr>
+              <a:t>() {</a:t>
+            </a:r>
+            <a:br>
+              <a:rPr kumimoji="0" lang="en-US" altLang="en-US" b="0" i="0" u="none" strike="noStrike" cap="none" normalizeH="0" baseline="0" dirty="0">
+                <a:ln>
+                  <a:noFill/>
+                </a:ln>
+                <a:solidFill>
+                  <a:srgbClr val="080808"/>
+                </a:solidFill>
+                <a:effectLst/>
+                <a:latin typeface="JetBrains Mono"/>
+              </a:rPr>
+            </a:br>
+            <a:r>
+              <a:rPr kumimoji="0" lang="en-US" altLang="en-US" b="0" i="0" u="none" strike="noStrike" cap="none" normalizeH="0" baseline="0" dirty="0">
+                <a:ln>
+                  <a:noFill/>
+                </a:ln>
+                <a:solidFill>
+                  <a:srgbClr val="080808"/>
+                </a:solidFill>
+                <a:effectLst/>
+                <a:latin typeface="JetBrains Mono"/>
+              </a:rPr>
+              <a:t>  </a:t>
+            </a:r>
+            <a:r>
+              <a:rPr kumimoji="0" lang="en-US" altLang="en-US" b="0" i="0" u="none" strike="noStrike" cap="none" normalizeH="0" baseline="0" dirty="0">
+                <a:ln>
+                  <a:noFill/>
+                </a:ln>
+                <a:solidFill>
+                  <a:srgbClr val="0033B3"/>
+                </a:solidFill>
+                <a:effectLst/>
+                <a:latin typeface="JetBrains Mono"/>
+              </a:rPr>
+              <a:t>void </a:t>
+            </a:r>
+            <a:r>
+              <a:rPr kumimoji="0" lang="en-US" altLang="en-US" b="0" i="0" u="none" strike="noStrike" cap="none" normalizeH="0" baseline="0" dirty="0">
+                <a:ln>
+                  <a:noFill/>
+                </a:ln>
+                <a:solidFill>
+                  <a:srgbClr val="080808"/>
+                </a:solidFill>
+                <a:effectLst/>
+                <a:latin typeface="JetBrains Mono"/>
+              </a:rPr>
+              <a:t>*</a:t>
+            </a:r>
+            <a:r>
+              <a:rPr kumimoji="0" lang="en-US" altLang="en-US" b="0" i="0" u="none" strike="noStrike" cap="none" normalizeH="0" baseline="0" dirty="0">
+                <a:ln>
+                  <a:noFill/>
+                </a:ln>
+                <a:solidFill>
+                  <a:srgbClr val="000000"/>
+                </a:solidFill>
+                <a:effectLst/>
+                <a:latin typeface="JetBrains Mono"/>
+              </a:rPr>
+              <a:t>p</a:t>
+            </a:r>
+            <a:r>
+              <a:rPr kumimoji="0" lang="en-US" altLang="en-US" b="0" i="0" u="none" strike="noStrike" cap="none" normalizeH="0" baseline="0" dirty="0">
+                <a:ln>
+                  <a:noFill/>
+                </a:ln>
+                <a:solidFill>
+                  <a:srgbClr val="080808"/>
+                </a:solidFill>
+                <a:effectLst/>
+                <a:latin typeface="JetBrains Mono"/>
+              </a:rPr>
+              <a:t>;</a:t>
+            </a:r>
+            <a:br>
+              <a:rPr kumimoji="0" lang="en-US" altLang="en-US" b="0" i="0" u="none" strike="noStrike" cap="none" normalizeH="0" baseline="0" dirty="0">
+                <a:ln>
+                  <a:noFill/>
+                </a:ln>
+                <a:solidFill>
+                  <a:srgbClr val="080808"/>
+                </a:solidFill>
+                <a:effectLst/>
+                <a:latin typeface="JetBrains Mono"/>
+              </a:rPr>
+            </a:br>
+            <a:r>
+              <a:rPr kumimoji="0" lang="en-US" altLang="en-US" b="0" i="0" u="none" strike="noStrike" cap="none" normalizeH="0" baseline="0" dirty="0">
+                <a:ln>
+                  <a:noFill/>
+                </a:ln>
+                <a:solidFill>
+                  <a:srgbClr val="080808"/>
+                </a:solidFill>
+                <a:effectLst/>
+                <a:latin typeface="JetBrains Mono"/>
+              </a:rPr>
+              <a:t>  </a:t>
+            </a:r>
+            <a:r>
+              <a:rPr kumimoji="0" lang="en-US" altLang="en-US" b="0" i="0" u="none" strike="noStrike" cap="none" normalizeH="0" baseline="0" dirty="0" err="1">
+                <a:ln>
+                  <a:noFill/>
+                </a:ln>
+                <a:solidFill>
+                  <a:srgbClr val="000000"/>
+                </a:solidFill>
+                <a:effectLst/>
+                <a:latin typeface="JetBrains Mono"/>
+              </a:rPr>
+              <a:t>size_t</a:t>
+            </a:r>
+            <a:r>
+              <a:rPr kumimoji="0" lang="en-US" altLang="en-US" b="0" i="0" u="none" strike="noStrike" cap="none" normalizeH="0" baseline="0" dirty="0">
+                <a:ln>
+                  <a:noFill/>
+                </a:ln>
+                <a:solidFill>
+                  <a:srgbClr val="000000"/>
+                </a:solidFill>
+                <a:effectLst/>
+                <a:latin typeface="JetBrains Mono"/>
+              </a:rPr>
+              <a:t> n</a:t>
+            </a:r>
+            <a:r>
+              <a:rPr kumimoji="0" lang="en-US" altLang="en-US" b="0" i="0" u="none" strike="noStrike" cap="none" normalizeH="0" baseline="0" dirty="0">
+                <a:ln>
+                  <a:noFill/>
+                </a:ln>
+                <a:solidFill>
+                  <a:srgbClr val="080808"/>
+                </a:solidFill>
+                <a:effectLst/>
+                <a:latin typeface="JetBrains Mono"/>
+              </a:rPr>
+              <a:t>;</a:t>
+            </a:r>
+            <a:br>
+              <a:rPr kumimoji="0" lang="en-US" altLang="en-US" b="0" i="0" u="none" strike="noStrike" cap="none" normalizeH="0" baseline="0" dirty="0">
+                <a:ln>
+                  <a:noFill/>
+                </a:ln>
+                <a:solidFill>
+                  <a:srgbClr val="080808"/>
+                </a:solidFill>
+                <a:effectLst/>
+                <a:latin typeface="JetBrains Mono"/>
+              </a:rPr>
+            </a:br>
+            <a:r>
+              <a:rPr kumimoji="0" lang="en-US" altLang="en-US" b="0" i="0" u="none" strike="noStrike" cap="none" normalizeH="0" baseline="0" dirty="0">
+                <a:ln>
+                  <a:noFill/>
+                </a:ln>
+                <a:solidFill>
+                  <a:srgbClr val="080808"/>
+                </a:solidFill>
+                <a:effectLst/>
+                <a:latin typeface="JetBrains Mono"/>
+              </a:rPr>
+              <a:t>  </a:t>
+            </a:r>
+            <a:r>
+              <a:rPr kumimoji="0" lang="en-US" altLang="en-US" b="0" i="0" u="none" strike="noStrike" cap="none" normalizeH="0" baseline="0" dirty="0">
+                <a:ln>
+                  <a:noFill/>
+                </a:ln>
+                <a:solidFill>
+                  <a:srgbClr val="0033B3"/>
+                </a:solidFill>
+                <a:effectLst/>
+                <a:latin typeface="JetBrains Mono"/>
+              </a:rPr>
+              <a:t>if </a:t>
+            </a:r>
+            <a:r>
+              <a:rPr kumimoji="0" lang="en-US" altLang="en-US" b="0" i="0" u="none" strike="noStrike" cap="none" normalizeH="0" baseline="0" dirty="0">
+                <a:ln>
+                  <a:noFill/>
+                </a:ln>
+                <a:solidFill>
+                  <a:srgbClr val="080808"/>
+                </a:solidFill>
+                <a:effectLst/>
+                <a:latin typeface="JetBrains Mono"/>
+              </a:rPr>
+              <a:t>(</a:t>
+            </a:r>
+            <a:r>
+              <a:rPr kumimoji="0" lang="en-US" altLang="en-US" b="0" i="0" u="none" strike="noStrike" cap="none" normalizeH="0" baseline="0" dirty="0" err="1">
+                <a:ln>
+                  <a:noFill/>
+                </a:ln>
+                <a:solidFill>
+                  <a:srgbClr val="00627A"/>
+                </a:solidFill>
+                <a:effectLst/>
+                <a:latin typeface="JetBrains Mono"/>
+              </a:rPr>
+              <a:t>getenv</a:t>
+            </a:r>
+            <a:r>
+              <a:rPr kumimoji="0" lang="en-US" altLang="en-US" b="0" i="0" u="none" strike="noStrike" cap="none" normalizeH="0" baseline="0" dirty="0">
+                <a:ln>
+                  <a:noFill/>
+                </a:ln>
+                <a:solidFill>
+                  <a:srgbClr val="080808"/>
+                </a:solidFill>
+                <a:effectLst/>
+                <a:latin typeface="JetBrains Mono"/>
+              </a:rPr>
+              <a:t>(</a:t>
+            </a:r>
+            <a:r>
+              <a:rPr kumimoji="0" lang="en-US" altLang="en-US" b="0" i="0" u="none" strike="noStrike" cap="none" normalizeH="0" baseline="0" dirty="0">
+                <a:ln>
+                  <a:noFill/>
+                </a:ln>
+                <a:solidFill>
+                  <a:srgbClr val="067D17"/>
+                </a:solidFill>
+                <a:effectLst/>
+                <a:latin typeface="JetBrains Mono"/>
+              </a:rPr>
+              <a:t>"TEST"</a:t>
+            </a:r>
+            <a:r>
+              <a:rPr kumimoji="0" lang="en-US" altLang="en-US" b="0" i="0" u="none" strike="noStrike" cap="none" normalizeH="0" baseline="0" dirty="0">
+                <a:ln>
+                  <a:noFill/>
+                </a:ln>
+                <a:solidFill>
+                  <a:srgbClr val="080808"/>
+                </a:solidFill>
+                <a:effectLst/>
+                <a:latin typeface="JetBrains Mono"/>
+              </a:rPr>
+              <a:t>)) {</a:t>
+            </a:r>
+            <a:br>
+              <a:rPr kumimoji="0" lang="en-US" altLang="en-US" b="0" i="0" u="none" strike="noStrike" cap="none" normalizeH="0" baseline="0" dirty="0">
+                <a:ln>
+                  <a:noFill/>
+                </a:ln>
+                <a:solidFill>
+                  <a:srgbClr val="080808"/>
+                </a:solidFill>
+                <a:effectLst/>
+                <a:latin typeface="JetBrains Mono"/>
+              </a:rPr>
+            </a:br>
+            <a:r>
+              <a:rPr kumimoji="0" lang="en-US" altLang="en-US" b="0" i="0" u="none" strike="noStrike" cap="none" normalizeH="0" baseline="0" dirty="0">
+                <a:ln>
+                  <a:noFill/>
+                </a:ln>
+                <a:solidFill>
+                  <a:srgbClr val="080808"/>
+                </a:solidFill>
+                <a:effectLst/>
+                <a:latin typeface="JetBrains Mono"/>
+              </a:rPr>
+              <a:t>    </a:t>
+            </a:r>
+            <a:r>
+              <a:rPr kumimoji="0" lang="en-US" altLang="en-US" b="0" i="0" u="none" strike="noStrike" cap="none" normalizeH="0" baseline="0" dirty="0">
+                <a:ln>
+                  <a:noFill/>
+                </a:ln>
+                <a:solidFill>
+                  <a:srgbClr val="000000"/>
+                </a:solidFill>
+                <a:effectLst/>
+                <a:latin typeface="JetBrains Mono"/>
+              </a:rPr>
+              <a:t>p </a:t>
+            </a:r>
+            <a:r>
+              <a:rPr kumimoji="0" lang="en-US" altLang="en-US" b="0" i="0" u="none" strike="noStrike" cap="none" normalizeH="0" baseline="0" dirty="0">
+                <a:ln>
+                  <a:noFill/>
+                </a:ln>
+                <a:solidFill>
+                  <a:srgbClr val="080808"/>
+                </a:solidFill>
+                <a:effectLst/>
+                <a:latin typeface="JetBrains Mono"/>
+              </a:rPr>
+              <a:t>= &amp;</a:t>
+            </a:r>
+            <a:r>
+              <a:rPr kumimoji="0" lang="en-US" altLang="en-US" b="0" i="0" u="none" strike="noStrike" cap="none" normalizeH="0" baseline="0" dirty="0">
+                <a:ln>
+                  <a:noFill/>
+                </a:ln>
+                <a:solidFill>
+                  <a:srgbClr val="000000"/>
+                </a:solidFill>
+                <a:effectLst/>
+                <a:latin typeface="JetBrains Mono"/>
+              </a:rPr>
+              <a:t>n</a:t>
+            </a:r>
+            <a:r>
+              <a:rPr kumimoji="0" lang="en-US" altLang="en-US" b="0" i="0" u="none" strike="noStrike" cap="none" normalizeH="0" baseline="0" dirty="0">
+                <a:ln>
+                  <a:noFill/>
+                </a:ln>
+                <a:solidFill>
+                  <a:srgbClr val="080808"/>
+                </a:solidFill>
+                <a:effectLst/>
+                <a:latin typeface="JetBrains Mono"/>
+              </a:rPr>
+              <a:t>;</a:t>
+            </a:r>
+            <a:br>
+              <a:rPr kumimoji="0" lang="en-US" altLang="en-US" b="0" i="0" u="none" strike="noStrike" cap="none" normalizeH="0" baseline="0" dirty="0">
+                <a:ln>
+                  <a:noFill/>
+                </a:ln>
+                <a:solidFill>
+                  <a:srgbClr val="080808"/>
+                </a:solidFill>
+                <a:effectLst/>
+                <a:latin typeface="JetBrains Mono"/>
+              </a:rPr>
+            </a:br>
+            <a:r>
+              <a:rPr kumimoji="0" lang="en-US" altLang="en-US" b="0" i="0" u="none" strike="noStrike" cap="none" normalizeH="0" baseline="0" dirty="0">
+                <a:ln>
+                  <a:noFill/>
+                </a:ln>
+                <a:solidFill>
+                  <a:srgbClr val="080808"/>
+                </a:solidFill>
+                <a:effectLst/>
+                <a:latin typeface="JetBrains Mono"/>
+              </a:rPr>
+              <a:t>    </a:t>
+            </a:r>
+            <a:r>
+              <a:rPr kumimoji="0" lang="en-US" altLang="en-US" b="0" i="0" u="none" strike="noStrike" cap="none" normalizeH="0" baseline="0" dirty="0">
+                <a:ln>
+                  <a:noFill/>
+                </a:ln>
+                <a:solidFill>
+                  <a:srgbClr val="000000"/>
+                </a:solidFill>
+                <a:effectLst/>
+                <a:latin typeface="JetBrains Mono"/>
+              </a:rPr>
+              <a:t>n </a:t>
+            </a:r>
+            <a:r>
+              <a:rPr kumimoji="0" lang="en-US" altLang="en-US" b="0" i="0" u="none" strike="noStrike" cap="none" normalizeH="0" baseline="0" dirty="0">
+                <a:ln>
+                  <a:noFill/>
+                </a:ln>
+                <a:solidFill>
+                  <a:srgbClr val="080808"/>
+                </a:solidFill>
+                <a:effectLst/>
+                <a:latin typeface="JetBrains Mono"/>
+              </a:rPr>
+              <a:t>= </a:t>
+            </a:r>
+            <a:r>
+              <a:rPr kumimoji="0" lang="en-US" altLang="en-US" b="0" i="0" u="none" strike="noStrike" cap="none" normalizeH="0" baseline="0" dirty="0" err="1">
+                <a:ln>
+                  <a:noFill/>
+                </a:ln>
+                <a:solidFill>
+                  <a:srgbClr val="0033B3"/>
+                </a:solidFill>
+                <a:effectLst/>
+                <a:latin typeface="JetBrains Mono"/>
+              </a:rPr>
+              <a:t>sizeof</a:t>
+            </a:r>
+            <a:r>
+              <a:rPr kumimoji="0" lang="en-US" altLang="en-US" b="0" i="0" u="none" strike="noStrike" cap="none" normalizeH="0" baseline="0" dirty="0">
+                <a:ln>
+                  <a:noFill/>
+                </a:ln>
+                <a:solidFill>
+                  <a:srgbClr val="0033B3"/>
+                </a:solidFill>
+                <a:effectLst/>
+                <a:latin typeface="JetBrains Mono"/>
+              </a:rPr>
+              <a:t> </a:t>
+            </a:r>
+            <a:r>
+              <a:rPr kumimoji="0" lang="en-US" altLang="en-US" b="0" i="0" u="none" strike="noStrike" cap="none" normalizeH="0" baseline="0" dirty="0">
+                <a:ln>
+                  <a:noFill/>
+                </a:ln>
+                <a:solidFill>
+                  <a:srgbClr val="000000"/>
+                </a:solidFill>
+                <a:effectLst/>
+                <a:latin typeface="JetBrains Mono"/>
+              </a:rPr>
+              <a:t>n</a:t>
+            </a:r>
+            <a:r>
+              <a:rPr kumimoji="0" lang="en-US" altLang="en-US" b="0" i="0" u="none" strike="noStrike" cap="none" normalizeH="0" baseline="0" dirty="0">
+                <a:ln>
+                  <a:noFill/>
+                </a:ln>
+                <a:solidFill>
+                  <a:srgbClr val="080808"/>
+                </a:solidFill>
+                <a:effectLst/>
+                <a:latin typeface="JetBrains Mono"/>
+              </a:rPr>
+              <a:t>;</a:t>
+            </a:r>
+            <a:br>
+              <a:rPr kumimoji="0" lang="en-US" altLang="en-US" b="0" i="0" u="none" strike="noStrike" cap="none" normalizeH="0" baseline="0" dirty="0">
+                <a:ln>
+                  <a:noFill/>
+                </a:ln>
+                <a:solidFill>
+                  <a:srgbClr val="080808"/>
+                </a:solidFill>
+                <a:effectLst/>
+                <a:latin typeface="JetBrains Mono"/>
+              </a:rPr>
+            </a:br>
+            <a:r>
+              <a:rPr kumimoji="0" lang="en-US" altLang="en-US" b="0" i="0" u="none" strike="noStrike" cap="none" normalizeH="0" baseline="0" dirty="0">
+                <a:ln>
+                  <a:noFill/>
+                </a:ln>
+                <a:solidFill>
+                  <a:srgbClr val="080808"/>
+                </a:solidFill>
+                <a:effectLst/>
+                <a:latin typeface="JetBrains Mono"/>
+              </a:rPr>
+              <a:t>    </a:t>
+            </a:r>
+            <a:r>
+              <a:rPr kumimoji="0" lang="en-US" altLang="en-US" b="0" i="0" u="none" strike="noStrike" cap="none" normalizeH="0" baseline="0" dirty="0">
+                <a:ln>
+                  <a:noFill/>
+                </a:ln>
+                <a:solidFill>
+                  <a:srgbClr val="00627A"/>
+                </a:solidFill>
+                <a:effectLst/>
+                <a:latin typeface="JetBrains Mono"/>
+              </a:rPr>
+              <a:t>puts</a:t>
+            </a:r>
+            <a:r>
+              <a:rPr kumimoji="0" lang="en-US" altLang="en-US" b="0" i="0" u="none" strike="noStrike" cap="none" normalizeH="0" baseline="0" dirty="0">
+                <a:ln>
+                  <a:noFill/>
+                </a:ln>
+                <a:solidFill>
+                  <a:srgbClr val="080808"/>
+                </a:solidFill>
+                <a:effectLst/>
+                <a:latin typeface="JetBrains Mono"/>
+              </a:rPr>
+              <a:t>(</a:t>
+            </a:r>
+            <a:r>
+              <a:rPr kumimoji="0" lang="en-US" altLang="en-US" b="0" i="0" u="none" strike="noStrike" cap="none" normalizeH="0" baseline="0" dirty="0">
+                <a:ln>
+                  <a:noFill/>
+                </a:ln>
+                <a:solidFill>
+                  <a:srgbClr val="067D17"/>
+                </a:solidFill>
+                <a:effectLst/>
+                <a:latin typeface="JetBrains Mono"/>
+              </a:rPr>
+              <a:t>"Hello"</a:t>
+            </a:r>
+            <a:r>
+              <a:rPr kumimoji="0" lang="en-US" altLang="en-US" b="0" i="0" u="none" strike="noStrike" cap="none" normalizeH="0" baseline="0" dirty="0">
+                <a:ln>
+                  <a:noFill/>
+                </a:ln>
+                <a:solidFill>
+                  <a:srgbClr val="080808"/>
+                </a:solidFill>
+                <a:effectLst/>
+                <a:latin typeface="JetBrains Mono"/>
+              </a:rPr>
+              <a:t>);</a:t>
+            </a:r>
+            <a:br>
+              <a:rPr kumimoji="0" lang="en-US" altLang="en-US" b="0" i="0" u="none" strike="noStrike" cap="none" normalizeH="0" baseline="0" dirty="0">
+                <a:ln>
+                  <a:noFill/>
+                </a:ln>
+                <a:solidFill>
+                  <a:srgbClr val="080808"/>
+                </a:solidFill>
+                <a:effectLst/>
+                <a:latin typeface="JetBrains Mono"/>
+              </a:rPr>
+            </a:br>
+            <a:r>
+              <a:rPr kumimoji="0" lang="en-US" altLang="en-US" b="0" i="0" u="none" strike="noStrike" cap="none" normalizeH="0" baseline="0" dirty="0">
+                <a:ln>
+                  <a:noFill/>
+                </a:ln>
+                <a:solidFill>
+                  <a:srgbClr val="080808"/>
+                </a:solidFill>
+                <a:effectLst/>
+                <a:latin typeface="JetBrains Mono"/>
+              </a:rPr>
+              <a:t>  } </a:t>
+            </a:r>
+            <a:r>
+              <a:rPr kumimoji="0" lang="en-US" altLang="en-US" b="0" i="0" u="none" strike="noStrike" cap="none" normalizeH="0" baseline="0" dirty="0">
+                <a:ln>
+                  <a:noFill/>
+                </a:ln>
+                <a:solidFill>
+                  <a:srgbClr val="0033B3"/>
+                </a:solidFill>
+                <a:effectLst/>
+                <a:latin typeface="JetBrains Mono"/>
+              </a:rPr>
+              <a:t>else </a:t>
+            </a:r>
+            <a:r>
+              <a:rPr kumimoji="0" lang="en-US" altLang="en-US" b="0" i="0" u="none" strike="noStrike" cap="none" normalizeH="0" baseline="0" dirty="0">
+                <a:ln>
+                  <a:noFill/>
+                </a:ln>
+                <a:solidFill>
+                  <a:srgbClr val="080808"/>
+                </a:solidFill>
+                <a:effectLst/>
+                <a:latin typeface="JetBrains Mono"/>
+              </a:rPr>
+              <a:t>{</a:t>
+            </a:r>
+            <a:br>
+              <a:rPr kumimoji="0" lang="en-US" altLang="en-US" b="0" i="0" u="none" strike="noStrike" cap="none" normalizeH="0" baseline="0" dirty="0">
+                <a:ln>
+                  <a:noFill/>
+                </a:ln>
+                <a:solidFill>
+                  <a:srgbClr val="080808"/>
+                </a:solidFill>
+                <a:effectLst/>
+                <a:latin typeface="JetBrains Mono"/>
+              </a:rPr>
+            </a:br>
+            <a:r>
+              <a:rPr kumimoji="0" lang="en-US" altLang="en-US" b="0" i="0" u="none" strike="noStrike" cap="none" normalizeH="0" baseline="0" dirty="0">
+                <a:ln>
+                  <a:noFill/>
+                </a:ln>
+                <a:solidFill>
+                  <a:srgbClr val="080808"/>
+                </a:solidFill>
+                <a:effectLst/>
+                <a:latin typeface="JetBrains Mono"/>
+              </a:rPr>
+              <a:t>    </a:t>
+            </a:r>
+            <a:r>
+              <a:rPr kumimoji="0" lang="en-US" altLang="en-US" b="0" i="0" u="none" strike="noStrike" cap="none" normalizeH="0" baseline="0" dirty="0">
+                <a:ln>
+                  <a:noFill/>
+                </a:ln>
+                <a:solidFill>
+                  <a:srgbClr val="000000"/>
+                </a:solidFill>
+                <a:effectLst/>
+                <a:latin typeface="JetBrains Mono"/>
+              </a:rPr>
+              <a:t>p </a:t>
+            </a:r>
+            <a:r>
+              <a:rPr kumimoji="0" lang="en-US" altLang="en-US" b="0" i="0" u="none" strike="noStrike" cap="none" normalizeH="0" baseline="0" dirty="0">
+                <a:ln>
+                  <a:noFill/>
+                </a:ln>
+                <a:solidFill>
+                  <a:srgbClr val="080808"/>
+                </a:solidFill>
+                <a:effectLst/>
+                <a:latin typeface="JetBrains Mono"/>
+              </a:rPr>
+              <a:t>= </a:t>
+            </a:r>
+            <a:r>
+              <a:rPr kumimoji="0" lang="en-US" altLang="en-US" b="0" i="0" u="none" strike="noStrike" cap="none" normalizeH="0" baseline="0" dirty="0" err="1">
+                <a:ln>
+                  <a:noFill/>
+                </a:ln>
+                <a:solidFill>
+                  <a:srgbClr val="0033B3"/>
+                </a:solidFill>
+                <a:effectLst/>
+                <a:latin typeface="JetBrains Mono"/>
+              </a:rPr>
+              <a:t>nullptr</a:t>
+            </a:r>
+            <a:r>
+              <a:rPr kumimoji="0" lang="en-US" altLang="en-US" b="0" i="0" u="none" strike="noStrike" cap="none" normalizeH="0" baseline="0" dirty="0">
+                <a:ln>
+                  <a:noFill/>
+                </a:ln>
+                <a:solidFill>
+                  <a:srgbClr val="080808"/>
+                </a:solidFill>
+                <a:effectLst/>
+                <a:latin typeface="JetBrains Mono"/>
+              </a:rPr>
+              <a:t>;</a:t>
+            </a:r>
+            <a:br>
+              <a:rPr kumimoji="0" lang="en-US" altLang="en-US" b="0" i="0" u="none" strike="noStrike" cap="none" normalizeH="0" baseline="0" dirty="0">
+                <a:ln>
+                  <a:noFill/>
+                </a:ln>
+                <a:solidFill>
+                  <a:srgbClr val="080808"/>
+                </a:solidFill>
+                <a:effectLst/>
+                <a:latin typeface="JetBrains Mono"/>
+              </a:rPr>
+            </a:br>
+            <a:r>
+              <a:rPr kumimoji="0" lang="en-US" altLang="en-US" b="0" i="0" u="none" strike="noStrike" cap="none" normalizeH="0" baseline="0" dirty="0">
+                <a:ln>
+                  <a:noFill/>
+                </a:ln>
+                <a:solidFill>
+                  <a:srgbClr val="080808"/>
+                </a:solidFill>
+                <a:effectLst/>
+                <a:latin typeface="JetBrains Mono"/>
+              </a:rPr>
+              <a:t>    </a:t>
+            </a:r>
+            <a:r>
+              <a:rPr kumimoji="0" lang="en-US" altLang="en-US" b="0" i="0" u="none" strike="noStrike" cap="none" normalizeH="0" baseline="0" dirty="0">
+                <a:ln>
+                  <a:noFill/>
+                </a:ln>
+                <a:solidFill>
+                  <a:srgbClr val="000000"/>
+                </a:solidFill>
+                <a:effectLst/>
+                <a:latin typeface="JetBrains Mono"/>
+              </a:rPr>
+              <a:t>n </a:t>
+            </a:r>
+            <a:r>
+              <a:rPr kumimoji="0" lang="en-US" altLang="en-US" b="0" i="0" u="none" strike="noStrike" cap="none" normalizeH="0" baseline="0" dirty="0">
+                <a:ln>
+                  <a:noFill/>
+                </a:ln>
+                <a:solidFill>
+                  <a:srgbClr val="080808"/>
+                </a:solidFill>
+                <a:effectLst/>
+                <a:latin typeface="JetBrains Mono"/>
+              </a:rPr>
+              <a:t>= </a:t>
+            </a:r>
+            <a:r>
+              <a:rPr kumimoji="0" lang="en-US" altLang="en-US" b="0" i="0" u="none" strike="noStrike" cap="none" normalizeH="0" baseline="0" dirty="0">
+                <a:ln>
+                  <a:noFill/>
+                </a:ln>
+                <a:solidFill>
+                  <a:srgbClr val="1750EB"/>
+                </a:solidFill>
+                <a:effectLst/>
+                <a:latin typeface="JetBrains Mono"/>
+              </a:rPr>
+              <a:t>0</a:t>
+            </a:r>
+            <a:r>
+              <a:rPr kumimoji="0" lang="en-US" altLang="en-US" b="0" i="0" u="none" strike="noStrike" cap="none" normalizeH="0" baseline="0" dirty="0">
+                <a:ln>
+                  <a:noFill/>
+                </a:ln>
+                <a:solidFill>
+                  <a:srgbClr val="080808"/>
+                </a:solidFill>
+                <a:effectLst/>
+                <a:latin typeface="JetBrains Mono"/>
+              </a:rPr>
+              <a:t>;</a:t>
+            </a:r>
+            <a:br>
+              <a:rPr kumimoji="0" lang="en-US" altLang="en-US" b="0" i="0" u="none" strike="noStrike" cap="none" normalizeH="0" baseline="0" dirty="0">
+                <a:ln>
+                  <a:noFill/>
+                </a:ln>
+                <a:solidFill>
+                  <a:srgbClr val="080808"/>
+                </a:solidFill>
+                <a:effectLst/>
+                <a:latin typeface="JetBrains Mono"/>
+              </a:rPr>
+            </a:br>
+            <a:r>
+              <a:rPr kumimoji="0" lang="en-US" altLang="en-US" b="0" i="0" u="none" strike="noStrike" cap="none" normalizeH="0" baseline="0" dirty="0">
+                <a:ln>
+                  <a:noFill/>
+                </a:ln>
+                <a:solidFill>
+                  <a:srgbClr val="080808"/>
+                </a:solidFill>
+                <a:effectLst/>
+                <a:latin typeface="JetBrains Mono"/>
+              </a:rPr>
+              <a:t>  }</a:t>
+            </a:r>
+            <a:br>
+              <a:rPr kumimoji="0" lang="en-US" altLang="en-US" b="0" i="0" u="none" strike="noStrike" cap="none" normalizeH="0" baseline="0" dirty="0">
+                <a:ln>
+                  <a:noFill/>
+                </a:ln>
+                <a:solidFill>
+                  <a:srgbClr val="080808"/>
+                </a:solidFill>
+                <a:effectLst/>
+                <a:latin typeface="JetBrains Mono"/>
+              </a:rPr>
+            </a:br>
+            <a:r>
+              <a:rPr kumimoji="0" lang="en-US" altLang="en-US" b="0" i="0" u="none" strike="noStrike" cap="none" normalizeH="0" baseline="0" dirty="0">
+                <a:ln>
+                  <a:noFill/>
+                </a:ln>
+                <a:solidFill>
+                  <a:srgbClr val="080808"/>
+                </a:solidFill>
+                <a:effectLst/>
+                <a:latin typeface="JetBrains Mono"/>
+              </a:rPr>
+              <a:t>  </a:t>
+            </a:r>
+            <a:r>
+              <a:rPr kumimoji="0" lang="en-US" altLang="en-US" b="0" i="0" u="none" strike="noStrike" cap="none" normalizeH="0" baseline="0" dirty="0" err="1">
+                <a:ln>
+                  <a:noFill/>
+                </a:ln>
+                <a:solidFill>
+                  <a:srgbClr val="00627A"/>
+                </a:solidFill>
+                <a:effectLst/>
+                <a:latin typeface="JetBrains Mono"/>
+              </a:rPr>
+              <a:t>memset</a:t>
+            </a:r>
+            <a:r>
+              <a:rPr kumimoji="0" lang="en-US" altLang="en-US" b="0" i="0" u="none" strike="noStrike" cap="none" normalizeH="0" baseline="0" dirty="0">
+                <a:ln>
+                  <a:noFill/>
+                </a:ln>
+                <a:solidFill>
+                  <a:srgbClr val="080808"/>
+                </a:solidFill>
+                <a:effectLst/>
+                <a:latin typeface="JetBrains Mono"/>
+              </a:rPr>
+              <a:t>(</a:t>
+            </a:r>
+            <a:r>
+              <a:rPr kumimoji="0" lang="en-US" altLang="en-US" b="0" i="0" u="none" strike="noStrike" cap="none" normalizeH="0" baseline="0" dirty="0">
+                <a:ln>
+                  <a:noFill/>
+                </a:ln>
+                <a:solidFill>
+                  <a:srgbClr val="000000"/>
+                </a:solidFill>
+                <a:effectLst/>
+                <a:latin typeface="JetBrains Mono"/>
+              </a:rPr>
+              <a:t>p</a:t>
+            </a:r>
+            <a:r>
+              <a:rPr kumimoji="0" lang="en-US" altLang="en-US" b="0" i="0" u="none" strike="noStrike" cap="none" normalizeH="0" baseline="0" dirty="0">
+                <a:ln>
+                  <a:noFill/>
+                </a:ln>
+                <a:solidFill>
+                  <a:srgbClr val="080808"/>
+                </a:solidFill>
+                <a:effectLst/>
+                <a:latin typeface="JetBrains Mono"/>
+              </a:rPr>
+              <a:t>, </a:t>
+            </a:r>
+            <a:r>
+              <a:rPr kumimoji="0" lang="en-US" altLang="en-US" b="0" i="0" u="none" strike="noStrike" cap="none" normalizeH="0" baseline="0" dirty="0">
+                <a:ln>
+                  <a:noFill/>
+                </a:ln>
+                <a:solidFill>
+                  <a:srgbClr val="1750EB"/>
+                </a:solidFill>
+                <a:effectLst/>
+                <a:latin typeface="JetBrains Mono"/>
+              </a:rPr>
+              <a:t>0</a:t>
+            </a:r>
+            <a:r>
+              <a:rPr kumimoji="0" lang="en-US" altLang="en-US" b="0" i="0" u="none" strike="noStrike" cap="none" normalizeH="0" baseline="0" dirty="0">
+                <a:ln>
+                  <a:noFill/>
+                </a:ln>
+                <a:solidFill>
+                  <a:srgbClr val="080808"/>
+                </a:solidFill>
+                <a:effectLst/>
+                <a:latin typeface="JetBrains Mono"/>
+              </a:rPr>
+              <a:t>, </a:t>
+            </a:r>
+            <a:r>
+              <a:rPr kumimoji="0" lang="en-US" altLang="en-US" b="0" i="0" u="none" strike="noStrike" cap="none" normalizeH="0" baseline="0" dirty="0">
+                <a:ln>
+                  <a:noFill/>
+                </a:ln>
+                <a:solidFill>
+                  <a:srgbClr val="000000"/>
+                </a:solidFill>
+                <a:effectLst/>
+                <a:latin typeface="JetBrains Mono"/>
+              </a:rPr>
+              <a:t>n</a:t>
+            </a:r>
+            <a:r>
+              <a:rPr kumimoji="0" lang="en-US" altLang="en-US" b="0" i="0" u="none" strike="noStrike" cap="none" normalizeH="0" baseline="0" dirty="0">
+                <a:ln>
+                  <a:noFill/>
+                </a:ln>
+                <a:solidFill>
+                  <a:srgbClr val="080808"/>
+                </a:solidFill>
+                <a:effectLst/>
+                <a:latin typeface="JetBrains Mono"/>
+              </a:rPr>
+              <a:t>);</a:t>
+            </a:r>
+            <a:br>
+              <a:rPr kumimoji="0" lang="en-US" altLang="en-US" b="0" i="0" u="none" strike="noStrike" cap="none" normalizeH="0" baseline="0" dirty="0">
+                <a:ln>
+                  <a:noFill/>
+                </a:ln>
+                <a:solidFill>
+                  <a:srgbClr val="080808"/>
+                </a:solidFill>
+                <a:effectLst/>
+                <a:latin typeface="JetBrains Mono"/>
+              </a:rPr>
+            </a:br>
+            <a:r>
+              <a:rPr kumimoji="0" lang="en-US" altLang="en-US" b="0" i="0" u="none" strike="noStrike" cap="none" normalizeH="0" baseline="0" dirty="0">
+                <a:ln>
+                  <a:noFill/>
+                </a:ln>
+                <a:solidFill>
+                  <a:srgbClr val="080808"/>
+                </a:solidFill>
+                <a:effectLst/>
+                <a:latin typeface="JetBrains Mono"/>
+              </a:rPr>
+              <a:t>}</a:t>
+            </a:r>
+            <a:endParaRPr kumimoji="0" lang="en-US" altLang="en-US" sz="4400" b="0" i="0" u="none" strike="noStrike" cap="none" normalizeH="0" baseline="0" dirty="0">
+              <a:ln>
+                <a:noFill/>
+              </a:ln>
+              <a:solidFill>
+                <a:schemeClr val="tx1"/>
+              </a:solidFill>
+              <a:effectLst/>
+              <a:latin typeface="Arial" panose="020B0604020202020204" pitchFamily="34" charset="0"/>
+            </a:endParaRPr>
+          </a:p>
+        </p:txBody>
+      </p:sp>
+      <p:sp>
+        <p:nvSpPr>
+          <p:cNvPr id="8" name="TextBox 7">
+            <a:extLst>
+              <a:ext uri="{FF2B5EF4-FFF2-40B4-BE49-F238E27FC236}">
+                <a16:creationId xmlns:a16="http://schemas.microsoft.com/office/drawing/2014/main" id="{C4E0D4F9-F248-409F-A5D3-070C59544F24}"/>
+              </a:ext>
+            </a:extLst>
+          </p:cNvPr>
+          <p:cNvSpPr txBox="1"/>
+          <p:nvPr/>
+        </p:nvSpPr>
+        <p:spPr>
+          <a:xfrm>
+            <a:off x="4589326" y="3160444"/>
+            <a:ext cx="1938159" cy="369332"/>
+          </a:xfrm>
+          <a:prstGeom prst="rect">
+            <a:avLst/>
+          </a:prstGeom>
+          <a:noFill/>
+        </p:spPr>
+        <p:txBody>
+          <a:bodyPr wrap="none" rtlCol="0">
+            <a:spAutoFit/>
+          </a:bodyPr>
+          <a:lstStyle/>
+          <a:p>
+            <a:r>
+              <a:rPr lang="ru-RU" dirty="0"/>
+              <a:t>С фортификацией</a:t>
+            </a:r>
+            <a:endParaRPr lang="en-US" dirty="0"/>
+          </a:p>
+        </p:txBody>
+      </p:sp>
+      <p:sp>
+        <p:nvSpPr>
+          <p:cNvPr id="9" name="Rectangle 3">
+            <a:extLst>
+              <a:ext uri="{FF2B5EF4-FFF2-40B4-BE49-F238E27FC236}">
+                <a16:creationId xmlns:a16="http://schemas.microsoft.com/office/drawing/2014/main" id="{7AA4FC60-8386-41BD-8A65-0EE4E7FB0D56}"/>
+              </a:ext>
+            </a:extLst>
+          </p:cNvPr>
+          <p:cNvSpPr>
+            <a:spLocks noChangeArrowheads="1"/>
+          </p:cNvSpPr>
+          <p:nvPr/>
+        </p:nvSpPr>
+        <p:spPr bwMode="auto">
+          <a:xfrm>
+            <a:off x="7173986" y="3301059"/>
+            <a:ext cx="2558642" cy="1200329"/>
+          </a:xfrm>
+          <a:prstGeom prst="rect">
+            <a:avLst/>
+          </a:prstGeom>
+          <a:solidFill>
+            <a:srgbClr val="FFFFFF"/>
+          </a:solidFill>
+          <a:ln>
+            <a:noFill/>
+          </a:ln>
+          <a:effectLst/>
+          <a:extLst>
+            <a:ext uri="{91240B29-F687-4F45-9708-019B960494DF}">
+              <a14:hiddenLine xmlns:a14="http://schemas.microsoft.com/office/drawing/2010/main" w="9525">
+                <a:solidFill>
+                  <a:schemeClr val="tx1"/>
+                </a:solidFill>
+                <a:miter lim="800000"/>
+                <a:headEnd/>
+                <a:tailEnd/>
+              </a14:hiddenLine>
+            </a:ext>
+            <a:ext uri="{AF507438-7753-43E0-B8FC-AC1667EBCBE1}">
+              <a14:hiddenEffects xmlns:a14="http://schemas.microsoft.com/office/drawing/2010/main">
+                <a:effectLst>
+                  <a:outerShdw dist="35921" dir="2700000" algn="ctr" rotWithShape="0">
+                    <a:schemeClr val="bg2"/>
+                  </a:outerShdw>
+                </a:effectLst>
+              </a14:hiddenEffects>
+            </a:ext>
+          </a:extLst>
+        </p:spPr>
+        <p:txBody>
+          <a:bodyPr vert="horz" wrap="square" lIns="91440" tIns="45720" rIns="91440" bIns="45720" numCol="1" anchor="ctr" anchorCtr="0" compatLnSpc="1">
+            <a:prstTxWarp prst="textNoShape">
+              <a:avLst/>
+            </a:prstTxWarp>
+            <a:spAutoFit/>
+          </a:bodyPr>
+          <a:lstStyle/>
+          <a:p>
+            <a:pPr marL="0" marR="0" lvl="0" indent="0" algn="l" defTabSz="914400" rtl="0" eaLnBrk="0" fontAlgn="base" latinLnBrk="0" hangingPunct="0">
+              <a:lnSpc>
+                <a:spcPct val="100000"/>
+              </a:lnSpc>
+              <a:spcBef>
+                <a:spcPct val="0"/>
+              </a:spcBef>
+              <a:spcAft>
+                <a:spcPct val="0"/>
+              </a:spcAft>
+              <a:buClrTx/>
+              <a:buSzTx/>
+              <a:buFontTx/>
+              <a:buNone/>
+              <a:tabLst/>
+            </a:pPr>
+            <a:r>
+              <a:rPr kumimoji="0" lang="en-US" altLang="en-US" b="0" i="0" u="none" strike="noStrike" cap="none" normalizeH="0" baseline="0" dirty="0">
+                <a:ln>
+                  <a:noFill/>
+                </a:ln>
+                <a:solidFill>
+                  <a:srgbClr val="0033B3"/>
+                </a:solidFill>
+                <a:effectLst/>
+                <a:latin typeface="JetBrains Mono"/>
+              </a:rPr>
+              <a:t>int </a:t>
+            </a:r>
+            <a:r>
+              <a:rPr kumimoji="0" lang="en-US" altLang="en-US" b="0" i="0" u="none" strike="noStrike" cap="none" normalizeH="0" baseline="0" dirty="0">
+                <a:ln>
+                  <a:noFill/>
+                </a:ln>
+                <a:solidFill>
+                  <a:srgbClr val="00627A"/>
+                </a:solidFill>
+                <a:effectLst/>
+                <a:latin typeface="JetBrains Mono"/>
+              </a:rPr>
+              <a:t>main</a:t>
+            </a:r>
+            <a:r>
+              <a:rPr kumimoji="0" lang="en-US" altLang="en-US" b="0" i="0" u="none" strike="noStrike" cap="none" normalizeH="0" baseline="0" dirty="0">
+                <a:ln>
+                  <a:noFill/>
+                </a:ln>
+                <a:solidFill>
+                  <a:srgbClr val="080808"/>
+                </a:solidFill>
+                <a:effectLst/>
+                <a:latin typeface="JetBrains Mono"/>
+              </a:rPr>
+              <a:t>() {</a:t>
+            </a:r>
+            <a:br>
+              <a:rPr kumimoji="0" lang="en-US" altLang="en-US" b="0" i="0" u="none" strike="noStrike" cap="none" normalizeH="0" baseline="0" dirty="0">
+                <a:ln>
+                  <a:noFill/>
+                </a:ln>
+                <a:solidFill>
+                  <a:srgbClr val="080808"/>
+                </a:solidFill>
+                <a:effectLst/>
+                <a:latin typeface="JetBrains Mono"/>
+              </a:rPr>
+            </a:br>
+            <a:r>
+              <a:rPr kumimoji="0" lang="en-US" altLang="en-US" b="0" i="0" u="none" strike="noStrike" cap="none" normalizeH="0" baseline="0" dirty="0">
+                <a:ln>
+                  <a:noFill/>
+                </a:ln>
+                <a:solidFill>
+                  <a:srgbClr val="080808"/>
+                </a:solidFill>
+                <a:effectLst/>
+                <a:latin typeface="JetBrains Mono"/>
+              </a:rPr>
+              <a:t>  </a:t>
+            </a:r>
+            <a:r>
+              <a:rPr kumimoji="0" lang="en-US" altLang="en-US" b="0" i="0" u="none" strike="noStrike" cap="none" normalizeH="0" baseline="0" dirty="0" err="1">
+                <a:ln>
+                  <a:noFill/>
+                </a:ln>
+                <a:solidFill>
+                  <a:srgbClr val="00627A"/>
+                </a:solidFill>
+                <a:effectLst/>
+                <a:latin typeface="JetBrains Mono"/>
+              </a:rPr>
+              <a:t>getenv</a:t>
+            </a:r>
+            <a:r>
+              <a:rPr kumimoji="0" lang="en-US" altLang="en-US" b="0" i="0" u="none" strike="noStrike" cap="none" normalizeH="0" baseline="0" dirty="0">
+                <a:ln>
+                  <a:noFill/>
+                </a:ln>
+                <a:solidFill>
+                  <a:srgbClr val="080808"/>
+                </a:solidFill>
+                <a:effectLst/>
+                <a:latin typeface="JetBrains Mono"/>
+              </a:rPr>
+              <a:t>(</a:t>
+            </a:r>
+            <a:r>
+              <a:rPr kumimoji="0" lang="en-US" altLang="en-US" b="0" i="0" u="none" strike="noStrike" cap="none" normalizeH="0" baseline="0" dirty="0">
+                <a:ln>
+                  <a:noFill/>
+                </a:ln>
+                <a:solidFill>
+                  <a:srgbClr val="067D17"/>
+                </a:solidFill>
+                <a:effectLst/>
+                <a:latin typeface="JetBrains Mono"/>
+              </a:rPr>
+              <a:t>"TEST"</a:t>
+            </a:r>
+            <a:r>
+              <a:rPr kumimoji="0" lang="en-US" altLang="en-US" b="0" i="0" u="none" strike="noStrike" cap="none" normalizeH="0" baseline="0" dirty="0">
+                <a:ln>
+                  <a:noFill/>
+                </a:ln>
+                <a:solidFill>
+                  <a:srgbClr val="080808"/>
+                </a:solidFill>
+                <a:effectLst/>
+                <a:latin typeface="JetBrains Mono"/>
+              </a:rPr>
+              <a:t>);</a:t>
+            </a:r>
+            <a:br>
+              <a:rPr kumimoji="0" lang="en-US" altLang="en-US" b="0" i="0" u="none" strike="noStrike" cap="none" normalizeH="0" baseline="0" dirty="0">
+                <a:ln>
+                  <a:noFill/>
+                </a:ln>
+                <a:solidFill>
+                  <a:srgbClr val="080808"/>
+                </a:solidFill>
+                <a:effectLst/>
+                <a:latin typeface="JetBrains Mono"/>
+              </a:rPr>
+            </a:br>
+            <a:r>
+              <a:rPr kumimoji="0" lang="en-US" altLang="en-US" b="0" i="0" u="none" strike="noStrike" cap="none" normalizeH="0" baseline="0" dirty="0">
+                <a:ln>
+                  <a:noFill/>
+                </a:ln>
+                <a:solidFill>
+                  <a:srgbClr val="080808"/>
+                </a:solidFill>
+                <a:effectLst/>
+                <a:latin typeface="JetBrains Mono"/>
+              </a:rPr>
+              <a:t>  </a:t>
+            </a:r>
+            <a:r>
+              <a:rPr kumimoji="0" lang="en-US" altLang="en-US" b="0" i="0" u="none" strike="noStrike" cap="none" normalizeH="0" baseline="0" dirty="0">
+                <a:ln>
+                  <a:noFill/>
+                </a:ln>
+                <a:solidFill>
+                  <a:srgbClr val="00627A"/>
+                </a:solidFill>
+                <a:effectLst/>
+                <a:latin typeface="JetBrains Mono"/>
+              </a:rPr>
+              <a:t>puts</a:t>
+            </a:r>
+            <a:r>
+              <a:rPr kumimoji="0" lang="en-US" altLang="en-US" b="0" i="0" u="none" strike="noStrike" cap="none" normalizeH="0" baseline="0" dirty="0">
+                <a:ln>
+                  <a:noFill/>
+                </a:ln>
+                <a:solidFill>
+                  <a:srgbClr val="080808"/>
+                </a:solidFill>
+                <a:effectLst/>
+                <a:latin typeface="JetBrains Mono"/>
+              </a:rPr>
+              <a:t>(</a:t>
+            </a:r>
+            <a:r>
+              <a:rPr kumimoji="0" lang="en-US" altLang="en-US" b="0" i="0" u="none" strike="noStrike" cap="none" normalizeH="0" baseline="0" dirty="0">
+                <a:ln>
+                  <a:noFill/>
+                </a:ln>
+                <a:solidFill>
+                  <a:srgbClr val="067D17"/>
+                </a:solidFill>
+                <a:effectLst/>
+                <a:latin typeface="JetBrains Mono"/>
+              </a:rPr>
+              <a:t>"Hello"</a:t>
+            </a:r>
+            <a:r>
+              <a:rPr kumimoji="0" lang="en-US" altLang="en-US" b="0" i="0" u="none" strike="noStrike" cap="none" normalizeH="0" baseline="0" dirty="0">
+                <a:ln>
+                  <a:noFill/>
+                </a:ln>
+                <a:solidFill>
+                  <a:srgbClr val="080808"/>
+                </a:solidFill>
+                <a:effectLst/>
+                <a:latin typeface="JetBrains Mono"/>
+              </a:rPr>
+              <a:t>);</a:t>
+            </a:r>
+            <a:br>
+              <a:rPr kumimoji="0" lang="en-US" altLang="en-US" b="0" i="0" u="none" strike="noStrike" cap="none" normalizeH="0" baseline="0" dirty="0">
+                <a:ln>
+                  <a:noFill/>
+                </a:ln>
+                <a:solidFill>
+                  <a:srgbClr val="080808"/>
+                </a:solidFill>
+                <a:effectLst/>
+                <a:latin typeface="JetBrains Mono"/>
+              </a:rPr>
+            </a:br>
+            <a:r>
+              <a:rPr kumimoji="0" lang="en-US" altLang="en-US" b="0" i="0" u="none" strike="noStrike" cap="none" normalizeH="0" baseline="0" dirty="0">
+                <a:ln>
+                  <a:noFill/>
+                </a:ln>
+                <a:solidFill>
+                  <a:srgbClr val="080808"/>
+                </a:solidFill>
+                <a:effectLst/>
+                <a:latin typeface="JetBrains Mono"/>
+              </a:rPr>
+              <a:t>}</a:t>
+            </a:r>
+            <a:endParaRPr kumimoji="0" lang="en-US" altLang="en-US" sz="4400" b="0" i="0" u="none" strike="noStrike" cap="none" normalizeH="0" baseline="0" dirty="0">
+              <a:ln>
+                <a:noFill/>
+              </a:ln>
+              <a:solidFill>
+                <a:schemeClr val="tx1"/>
+              </a:solidFill>
+              <a:effectLst/>
+              <a:latin typeface="Arial" panose="020B0604020202020204" pitchFamily="34" charset="0"/>
+            </a:endParaRPr>
+          </a:p>
+        </p:txBody>
+      </p:sp>
+      <p:sp>
+        <p:nvSpPr>
+          <p:cNvPr id="11" name="Arrow: Right 10">
+            <a:extLst>
+              <a:ext uri="{FF2B5EF4-FFF2-40B4-BE49-F238E27FC236}">
+                <a16:creationId xmlns:a16="http://schemas.microsoft.com/office/drawing/2014/main" id="{C0F3C724-1AD6-4A02-8D22-C1C47529E7D4}"/>
+              </a:ext>
+            </a:extLst>
+          </p:cNvPr>
+          <p:cNvSpPr/>
+          <p:nvPr/>
+        </p:nvSpPr>
+        <p:spPr>
+          <a:xfrm>
+            <a:off x="4941815" y="3808946"/>
+            <a:ext cx="1233182" cy="184558"/>
+          </a:xfrm>
+          <a:prstGeom prst="rightArrow">
+            <a:avLst/>
+          </a:prstGeom>
+        </p:spPr>
+        <p:style>
+          <a:lnRef idx="2">
+            <a:schemeClr val="accent1">
+              <a:shade val="50000"/>
+            </a:schemeClr>
+          </a:lnRef>
+          <a:fillRef idx="1">
+            <a:schemeClr val="accent1"/>
+          </a:fillRef>
+          <a:effectRef idx="0">
+            <a:schemeClr val="accent1"/>
+          </a:effectRef>
+          <a:fontRef idx="minor">
+            <a:schemeClr val="lt1"/>
+          </a:fontRef>
+        </p:style>
+        <p:txBody>
+          <a:bodyPr rtlCol="0" anchor="ctr"/>
+          <a:lstStyle/>
+          <a:p>
+            <a:pPr algn="ctr"/>
+            <a:endParaRPr lang="en-US"/>
+          </a:p>
+        </p:txBody>
+      </p:sp>
+      <p:sp>
+        <p:nvSpPr>
+          <p:cNvPr id="3" name="Slide Number Placeholder 2">
+            <a:extLst>
+              <a:ext uri="{FF2B5EF4-FFF2-40B4-BE49-F238E27FC236}">
+                <a16:creationId xmlns:a16="http://schemas.microsoft.com/office/drawing/2014/main" id="{84BBF934-B611-42CF-8488-A03E04FF9F4E}"/>
+              </a:ext>
+            </a:extLst>
+          </p:cNvPr>
+          <p:cNvSpPr>
+            <a:spLocks noGrp="1"/>
+          </p:cNvSpPr>
+          <p:nvPr>
+            <p:ph type="sldNum" sz="quarter" idx="12"/>
+          </p:nvPr>
+        </p:nvSpPr>
+        <p:spPr/>
+        <p:txBody>
+          <a:bodyPr/>
+          <a:lstStyle/>
+          <a:p>
+            <a:fld id="{C4166A4A-BC63-4E3E-8737-A1316BCBB6DC}" type="slidenum">
+              <a:rPr lang="en-US" smtClean="0"/>
+              <a:t>19</a:t>
+            </a:fld>
+            <a:endParaRPr lang="en-US"/>
+          </a:p>
+        </p:txBody>
+      </p:sp>
+    </p:spTree>
+    <p:extLst>
+      <p:ext uri="{BB962C8B-B14F-4D97-AF65-F5344CB8AC3E}">
+        <p14:creationId xmlns:p14="http://schemas.microsoft.com/office/powerpoint/2010/main" val="2352387485"/>
       </p:ext>
     </p:extLst>
   </p:cSld>
@@ -9025,7 +11011,7 @@
             </a:r>
             <a:r>
               <a:rPr lang="en-US" dirty="0"/>
-              <a:t>hardening ?</a:t>
+              <a:t>hardening</a:t>
             </a:r>
           </a:p>
         </p:txBody>
@@ -9061,22 +11047,51 @@
             </a:r>
             <a:r>
               <a:rPr lang="ru-RU" dirty="0"/>
-              <a:t>или предотвращения различных видов ошибок</a:t>
+              <a:t>или предотвращения различных видов уязвимостей</a:t>
             </a:r>
           </a:p>
           <a:p>
             <a:pPr lvl="1"/>
             <a:r>
               <a:rPr lang="ru-RU" dirty="0"/>
-              <a:t>выход за границу буфера, обращение по невалидному адресу, использование неинициализированных переменных и т.п</a:t>
+              <a:t>Выход за границу буфера, обращение по невалидному адресу, использование неинициализированных переменных и т.п</a:t>
             </a:r>
           </a:p>
           <a:p>
             <a:r>
               <a:rPr lang="ru-RU" dirty="0"/>
-              <a:t>Можно использовать в релизной версии продуктового кода</a:t>
+              <a:t>Можно использовать в продуктовом коде релизной версии</a:t>
             </a:r>
             <a:endParaRPr lang="en-US" dirty="0"/>
+          </a:p>
+        </p:txBody>
+      </p:sp>
+      <p:sp>
+        <p:nvSpPr>
+          <p:cNvPr id="4" name="Slide Number Placeholder 3">
+            <a:extLst>
+              <a:ext uri="{FF2B5EF4-FFF2-40B4-BE49-F238E27FC236}">
+                <a16:creationId xmlns:a16="http://schemas.microsoft.com/office/drawing/2014/main" id="{23015A5B-8210-4FA8-A4C3-DBF858D464AE}"/>
+              </a:ext>
+            </a:extLst>
+          </p:cNvPr>
+          <p:cNvSpPr>
+            <a:spLocks noGrp="1"/>
+          </p:cNvSpPr>
+          <p:nvPr>
+            <p:ph type="sldNum" sz="quarter" idx="12"/>
+          </p:nvPr>
+        </p:nvSpPr>
+        <p:spPr/>
+        <p:txBody>
+          <a:bodyPr/>
+          <a:lstStyle/>
+          <a:p>
+            <a:fld id="{C4166A4A-BC63-4E3E-8737-A1316BCBB6DC}" type="slidenum">
+              <a:rPr lang="en-US" smtClean="0"/>
+              <a:t>2</a:t>
+            </a:fld>
+            <a:endParaRPr lang="en-US"/>
           </a:p>
         </p:txBody>
       </p:sp>
@@ -9115,6 +11130,126 @@
           <p:cNvPr id="2" name="Title 1">
             <a:extLst>
               <a:ext uri="{FF2B5EF4-FFF2-40B4-BE49-F238E27FC236}">
+                <a16:creationId xmlns:a16="http://schemas.microsoft.com/office/drawing/2014/main" id="{AFBF1723-85E8-48C7-A7F8-13051BC72DD4}"/>
+              </a:ext>
+            </a:extLst>
+          </p:cNvPr>
+          <p:cNvSpPr>
+            <a:spLocks noGrp="1"/>
+          </p:cNvSpPr>
+          <p:nvPr>
+            <p:ph type="title"/>
+          </p:nvPr>
+        </p:nvSpPr>
+        <p:spPr/>
+        <p:txBody>
+          <a:bodyPr/>
+          <a:lstStyle/>
+          <a:p>
+            <a:r>
+              <a:rPr lang="en-US" dirty="0"/>
+              <a:t>C++ Safe Buffers</a:t>
+            </a:r>
+          </a:p>
+        </p:txBody>
+      </p:sp>
+      <p:sp>
+        <p:nvSpPr>
+          <p:cNvPr id="3" name="Content Placeholder 2">
+            <a:extLst>
+              <a:ext uri="{FF2B5EF4-FFF2-40B4-BE49-F238E27FC236}">
+                <a16:creationId xmlns:a16="http://schemas.microsoft.com/office/drawing/2014/main" id="{815BBC37-1039-4EAB-8A48-92A1AFEE22E7}"/>
+              </a:ext>
+            </a:extLst>
+          </p:cNvPr>
+          <p:cNvSpPr>
+            <a:spLocks noGrp="1"/>
+          </p:cNvSpPr>
+          <p:nvPr>
+            <p:ph idx="1"/>
+          </p:nvPr>
+        </p:nvSpPr>
+        <p:spPr/>
+        <p:txBody>
+          <a:bodyPr/>
+          <a:lstStyle/>
+          <a:p>
+            <a:r>
+              <a:rPr lang="en-US" dirty="0"/>
+              <a:t>TODO</a:t>
+            </a:r>
+            <a:r>
+              <a:rPr lang="ru-RU" dirty="0"/>
+              <a:t> (1-3 мин)</a:t>
+            </a:r>
+            <a:endParaRPr lang="en-US" dirty="0"/>
+          </a:p>
+        </p:txBody>
+      </p:sp>
+      <p:sp>
+        <p:nvSpPr>
+          <p:cNvPr id="4" name="Slide Number Placeholder 3">
+            <a:extLst>
+              <a:ext uri="{FF2B5EF4-FFF2-40B4-BE49-F238E27FC236}">
+                <a16:creationId xmlns:a16="http://schemas.microsoft.com/office/drawing/2014/main" id="{CAB47721-D171-4155-9878-13597F2C8398}"/>
+              </a:ext>
+            </a:extLst>
+          </p:cNvPr>
+          <p:cNvSpPr>
+            <a:spLocks noGrp="1"/>
+          </p:cNvSpPr>
+          <p:nvPr>
+            <p:ph type="sldNum" sz="quarter" idx="12"/>
+          </p:nvPr>
+        </p:nvSpPr>
+        <p:spPr/>
+        <p:txBody>
+          <a:bodyPr/>
+          <a:lstStyle/>
+          <a:p>
+            <a:fld id="{C4166A4A-BC63-4E3E-8737-A1316BCBB6DC}" type="slidenum">
+              <a:rPr lang="en-US" smtClean="0"/>
+              <a:t>20</a:t>
+            </a:fld>
+            <a:endParaRPr lang="en-US"/>
+          </a:p>
+        </p:txBody>
+      </p:sp>
+    </p:spTree>
+    <p:extLst>
+      <p:ext uri="{BB962C8B-B14F-4D97-AF65-F5344CB8AC3E}">
+        <p14:creationId xmlns:p14="http://schemas.microsoft.com/office/powerpoint/2010/main" val="780768892"/>
+      </p:ext>
+    </p:extLst>
+  </p:cSld>
+  <p:clrMapOvr>
+    <a:masterClrMapping/>
+  </p:clrMapOvr>
+</p:sld>
+</file>
+
+<file path=ppt/slides/slide21.xml><?xml version="1.0" encoding="utf-8"?>
+<p:sld xmlns:a="http://schemas.openxmlformats.org/drawingml/2006/main" xmlns:r="http://schemas.openxmlformats.org/officeDocument/2006/relationships" xmlns:p="http://schemas.openxmlformats.org/presentationml/2006/main">
+  <p:cSld>
+    <p:spTree>
+      <p:nvGrpSpPr>
+        <p:cNvPr id="1" name=""/>
+        <p:cNvGrpSpPr/>
+        <p:nvPr/>
+      </p:nvGrpSpPr>
+      <p:grpSpPr>
+        <a:xfrm>
+          <a:off x="0" y="0"/>
+          <a:ext cx="0" cy="0"/>
+          <a:chOff x="0" y="0"/>
+          <a:chExt cx="0" cy="0"/>
+        </a:xfrm>
+      </p:grpSpPr>
+      <p:sp>
+        <p:nvSpPr>
+          <p:cNvPr id="2" name="Title 1">
+            <a:extLst>
+              <a:ext uri="{FF2B5EF4-FFF2-40B4-BE49-F238E27FC236}">
                 <a16:creationId xmlns:a16="http://schemas.microsoft.com/office/drawing/2014/main" id="{2314C17A-A403-44A7-9B9F-26ECD0F8A95F}"/>
               </a:ext>
             </a:extLst>
@@ -9227,6 +11362,35 @@
           </a:p>
         </p:txBody>
       </p:sp>
+      <p:sp>
+        <p:nvSpPr>
+          <p:cNvPr id="4" name="Slide Number Placeholder 3">
+            <a:extLst>
+              <a:ext uri="{FF2B5EF4-FFF2-40B4-BE49-F238E27FC236}">
+                <a16:creationId xmlns:a16="http://schemas.microsoft.com/office/drawing/2014/main" id="{024D47C2-592E-4C46-B178-ABD39BA70995}"/>
+              </a:ext>
+            </a:extLst>
+          </p:cNvPr>
+          <p:cNvSpPr>
+            <a:spLocks noGrp="1"/>
+          </p:cNvSpPr>
+          <p:nvPr>
+            <p:ph type="sldNum" sz="quarter" idx="12"/>
+          </p:nvPr>
+        </p:nvSpPr>
+        <p:spPr/>
+        <p:txBody>
+          <a:bodyPr/>
+          <a:lstStyle/>
+          <a:p>
+            <a:fld id="{C4166A4A-BC63-4E3E-8737-A1316BCBB6DC}" type="slidenum">
+              <a:rPr lang="en-US" smtClean="0"/>
+              <a:t>21</a:t>
+            </a:fld>
+            <a:endParaRPr lang="en-US"/>
+          </a:p>
+        </p:txBody>
+      </p:sp>
     </p:spTree>
     <p:extLst>
       <p:ext uri="{BB962C8B-B14F-4D97-AF65-F5344CB8AC3E}">
@@ -9240,7 +11404,7 @@
 </p:sld>
 </file>
 
-<file path=ppt/slides/slide21.xml><?xml version="1.0" encoding="utf-8"?>
+<file path=ppt/slides/slide22.xml><?xml version="1.0" encoding="utf-8"?>
 <p:sld xmlns:a="http://schemas.openxmlformats.org/drawingml/2006/main" xmlns:r="http://schemas.openxmlformats.org/officeDocument/2006/relationships" xmlns:p="http://schemas.openxmlformats.org/presentationml/2006/main">
   <p:cSld>
     <p:spTree>
@@ -9339,6 +11503,90 @@
           </a:p>
         </p:txBody>
       </p:sp>
+      <p:sp>
+        <p:nvSpPr>
+          <p:cNvPr id="4" name="TextBox 3">
+            <a:extLst>
+              <a:ext uri="{FF2B5EF4-FFF2-40B4-BE49-F238E27FC236}">
+                <a16:creationId xmlns:a16="http://schemas.microsoft.com/office/drawing/2014/main" id="{6365D3DA-B363-4848-8EFC-3BEDAD3FA18D}"/>
+              </a:ext>
+            </a:extLst>
+          </p:cNvPr>
+          <p:cNvSpPr txBox="1"/>
+          <p:nvPr/>
+        </p:nvSpPr>
+        <p:spPr>
+          <a:xfrm>
+            <a:off x="7717872" y="4580389"/>
+            <a:ext cx="3272434" cy="369332"/>
+          </a:xfrm>
+          <a:prstGeom prst="rect">
+            <a:avLst/>
+          </a:prstGeom>
+          <a:noFill/>
+        </p:spPr>
+        <p:txBody>
+          <a:bodyPr wrap="none" rtlCol="0">
+            <a:spAutoFit/>
+          </a:bodyPr>
+          <a:lstStyle/>
+          <a:p>
+            <a:r>
+              <a:rPr lang="en-US" dirty="0">
+                <a:solidFill>
+                  <a:srgbClr val="FF0000"/>
+                </a:solidFill>
+              </a:rPr>
+              <a:t>TODO: </a:t>
+            </a:r>
+            <a:r>
+              <a:rPr lang="ru-RU" dirty="0">
+                <a:solidFill>
+                  <a:srgbClr val="FF0000"/>
+                </a:solidFill>
+              </a:rPr>
+              <a:t>пример который был</a:t>
+            </a:r>
+            <a:r>
+              <a:rPr lang="en-US" dirty="0">
+                <a:solidFill>
+                  <a:srgbClr val="FF0000"/>
+                </a:solidFill>
+              </a:rPr>
+              <a:t> UB</a:t>
+            </a:r>
+          </a:p>
+        </p:txBody>
+      </p:sp>
+      <p:sp>
+        <p:nvSpPr>
+          <p:cNvPr id="5" name="Slide Number Placeholder 4">
+            <a:extLst>
+              <a:ext uri="{FF2B5EF4-FFF2-40B4-BE49-F238E27FC236}">
+                <a16:creationId xmlns:a16="http://schemas.microsoft.com/office/drawing/2014/main" id="{5B74EE4F-7AF9-4CAA-90A6-6D553A600AC8}"/>
+              </a:ext>
+            </a:extLst>
+          </p:cNvPr>
+          <p:cNvSpPr>
+            <a:spLocks noGrp="1"/>
+          </p:cNvSpPr>
+          <p:nvPr>
+            <p:ph type="sldNum" sz="quarter" idx="12"/>
+          </p:nvPr>
+        </p:nvSpPr>
+        <p:spPr/>
+        <p:txBody>
+          <a:bodyPr/>
+          <a:lstStyle/>
+          <a:p>
+            <a:fld id="{C4166A4A-BC63-4E3E-8737-A1316BCBB6DC}" type="slidenum">
+              <a:rPr lang="en-US" smtClean="0"/>
+              <a:t>22</a:t>
+            </a:fld>
+            <a:endParaRPr lang="en-US"/>
+          </a:p>
+        </p:txBody>
+      </p:sp>
     </p:spTree>
     <p:extLst>
       <p:ext uri="{BB962C8B-B14F-4D97-AF65-F5344CB8AC3E}">
@@ -9352,7 +11600,7 @@
 </p:sld>
 </file>
 
-<file path=ppt/slides/slide22.xml><?xml version="1.0" encoding="utf-8"?>
+<file path=ppt/slides/slide23.xml><?xml version="1.0" encoding="utf-8"?>
 <p:sld xmlns:a="http://schemas.openxmlformats.org/drawingml/2006/main" xmlns:r="http://schemas.openxmlformats.org/officeDocument/2006/relationships" xmlns:p="http://schemas.openxmlformats.org/presentationml/2006/main">
   <p:cSld>
     <p:spTree>
@@ -9462,6 +11710,35 @@
           </a:p>
         </p:txBody>
       </p:sp>
+      <p:sp>
+        <p:nvSpPr>
+          <p:cNvPr id="4" name="Slide Number Placeholder 3">
+            <a:extLst>
+              <a:ext uri="{FF2B5EF4-FFF2-40B4-BE49-F238E27FC236}">
+                <a16:creationId xmlns:a16="http://schemas.microsoft.com/office/drawing/2014/main" id="{8D2FECE9-642A-426A-BE41-C2647609D1DE}"/>
+              </a:ext>
+            </a:extLst>
+          </p:cNvPr>
+          <p:cNvSpPr>
+            <a:spLocks noGrp="1"/>
+          </p:cNvSpPr>
+          <p:nvPr>
+            <p:ph type="sldNum" sz="quarter" idx="12"/>
+          </p:nvPr>
+        </p:nvSpPr>
+        <p:spPr/>
+        <p:txBody>
+          <a:bodyPr/>
+          <a:lstStyle/>
+          <a:p>
+            <a:fld id="{C4166A4A-BC63-4E3E-8737-A1316BCBB6DC}" type="slidenum">
+              <a:rPr lang="en-US" smtClean="0"/>
+              <a:t>23</a:t>
+            </a:fld>
+            <a:endParaRPr lang="en-US"/>
+          </a:p>
+        </p:txBody>
+      </p:sp>
     </p:spTree>
     <p:extLst>
       <p:ext uri="{BB962C8B-B14F-4D97-AF65-F5344CB8AC3E}">
@@ -9475,7 +11752,7 @@
 </p:sld>
 </file>
 
-<file path=ppt/slides/slide23.xml><?xml version="1.0" encoding="utf-8"?>
+<file path=ppt/slides/slide24.xml><?xml version="1.0" encoding="utf-8"?>
 <p:sld xmlns:a="http://schemas.openxmlformats.org/drawingml/2006/main" xmlns:r="http://schemas.openxmlformats.org/officeDocument/2006/relationships" xmlns:p="http://schemas.openxmlformats.org/presentationml/2006/main">
   <p:cSld>
     <p:spTree>
@@ -12649,6 +14926,35 @@
           </a:p>
         </p:txBody>
       </p:sp>
+      <p:sp>
+        <p:nvSpPr>
+          <p:cNvPr id="3" name="Slide Number Placeholder 2">
+            <a:extLst>
+              <a:ext uri="{FF2B5EF4-FFF2-40B4-BE49-F238E27FC236}">
+                <a16:creationId xmlns:a16="http://schemas.microsoft.com/office/drawing/2014/main" id="{4E6934D2-7B25-44A7-AF02-CE9FFFA87DEE}"/>
+              </a:ext>
+            </a:extLst>
+          </p:cNvPr>
+          <p:cNvSpPr>
+            <a:spLocks noGrp="1"/>
+          </p:cNvSpPr>
+          <p:nvPr>
+            <p:ph type="sldNum" sz="quarter" idx="12"/>
+          </p:nvPr>
+        </p:nvSpPr>
+        <p:spPr/>
+        <p:txBody>
+          <a:bodyPr/>
+          <a:lstStyle/>
+          <a:p>
+            <a:fld id="{C4166A4A-BC63-4E3E-8737-A1316BCBB6DC}" type="slidenum">
+              <a:rPr lang="en-US" smtClean="0"/>
+              <a:t>24</a:t>
+            </a:fld>
+            <a:endParaRPr lang="en-US"/>
+          </a:p>
+        </p:txBody>
+      </p:sp>
     </p:spTree>
     <p:extLst>
       <p:ext uri="{BB962C8B-B14F-4D97-AF65-F5344CB8AC3E}">
@@ -12662,7 +14968,7 @@
 </p:sld>
 </file>
 
-<file path=ppt/slides/slide24.xml><?xml version="1.0" encoding="utf-8"?>
+<file path=ppt/slides/slide25.xml><?xml version="1.0" encoding="utf-8"?>
 <p:sld xmlns:a="http://schemas.openxmlformats.org/drawingml/2006/main" xmlns:r="http://schemas.openxmlformats.org/officeDocument/2006/relationships" xmlns:p="http://schemas.openxmlformats.org/presentationml/2006/main">
   <p:cSld>
     <p:spTree>
@@ -13371,42 +15677,12 @@
           </a:p>
         </p:txBody>
       </p:sp>
-    </p:spTree>
-    <p:extLst>
-      <p:ext uri="{BB962C8B-B14F-4D97-AF65-F5344CB8AC3E}">
-        <p14:creationId xmlns:p14="http://schemas.microsoft.com/office/powerpoint/2010/main" val="2973265757"/>
-      </p:ext>
-    </p:extLst>
-  </p:cSld>
-  <p:clrMapOvr>
-    <a:masterClrMapping/>
-  </p:clrMapOvr>
-</p:sld>
-</file>
-
-<file path=ppt/slides/slide25.xml><?xml version="1.0" encoding="utf-8"?>
-<p:sld xmlns:a="http://schemas.openxmlformats.org/drawingml/2006/main" xmlns:r="http://schemas.openxmlformats.org/officeDocument/2006/relationships" xmlns:p="http://schemas.openxmlformats.org/presentationml/2006/main">
-  <p:cSld>
-    <p:spTree>
-      <p:nvGrpSpPr>
-        <p:cNvPr id="1" name=""/>
-        <p:cNvGrpSpPr/>
-        <p:nvPr/>
-      </p:nvGrpSpPr>
-      <p:grpSpPr>
-        <a:xfrm>
-          <a:off x="0" y="0"/>
-          <a:ext cx="0" cy="0"/>
-          <a:chOff x="0" y="0"/>
-          <a:chExt cx="0" cy="0"/>
-        </a:xfrm>
-      </p:grpSpPr>
       <p:sp>
         <p:nvSpPr>
-          <p:cNvPr id="2" name="Title 1">
+          <p:cNvPr id="5" name="Slide Number Placeholder 4">
             <a:extLst>
               <a:ext uri="{FF2B5EF4-FFF2-40B4-BE49-F238E27FC236}">
-                <a16:creationId xmlns:a16="http://schemas.microsoft.com/office/drawing/2014/main" id="{7BD0C320-E067-40FF-B2EC-0AC2DEF2236C}"/>
+                <a16:creationId xmlns:a16="http://schemas.microsoft.com/office/drawing/2014/main" id="{5F024CA5-9D7F-441D-B3D2-00F2E04BB54D}"/>
               </a:ext>
             </a:extLst>
           </p:cNvPr>
@@ -13414,7 +15690,7 @@
             <a:spLocks noGrp="1"/>
           </p:cNvSpPr>
           <p:nvPr>
-            <p:ph type="title"/>
+            <p:ph type="sldNum" sz="quarter" idx="12"/>
           </p:nvPr>
         </p:nvSpPr>
         <p:spPr/>
@@ -13422,77 +15698,18 @@
           <a:bodyPr/>
           <a:lstStyle/>
           <a:p>
-            <a:r>
-              <a:rPr lang="ru-RU" dirty="0"/>
-              <a:t>Контракты</a:t>
-            </a:r>
-            <a:endParaRPr lang="en-US" dirty="0"/>
-          </a:p>
-        </p:txBody>
-      </p:sp>
-      <p:sp>
-        <p:nvSpPr>
-          <p:cNvPr id="3" name="Content Placeholder 2">
-            <a:extLst>
-              <a:ext uri="{FF2B5EF4-FFF2-40B4-BE49-F238E27FC236}">
-                <a16:creationId xmlns:a16="http://schemas.microsoft.com/office/drawing/2014/main" id="{6700AE7E-BE5E-4FBB-83C2-2F325B4FB63D}"/>
-              </a:ext>
-            </a:extLst>
-          </p:cNvPr>
-          <p:cNvSpPr>
-            <a:spLocks noGrp="1"/>
-          </p:cNvSpPr>
-          <p:nvPr>
-            <p:ph idx="1"/>
-          </p:nvPr>
-        </p:nvSpPr>
-        <p:spPr/>
-        <p:txBody>
-          <a:bodyPr/>
-          <a:lstStyle/>
-          <a:p>
-            <a:r>
-              <a:rPr lang="ru-RU" dirty="0"/>
-              <a:t>Контрактное программирование (</a:t>
-            </a:r>
-            <a:r>
-              <a:rPr lang="en-US" dirty="0" err="1"/>
-              <a:t>DbC</a:t>
-            </a:r>
-            <a:r>
-              <a:rPr lang="ru-RU" dirty="0"/>
-              <a:t>)</a:t>
-            </a:r>
-            <a:endParaRPr lang="en-US" dirty="0"/>
-          </a:p>
-          <a:p>
-            <a:pPr lvl="1"/>
-            <a:r>
-              <a:rPr lang="ru-RU" dirty="0"/>
-              <a:t>Предусловия</a:t>
-            </a:r>
-          </a:p>
-          <a:p>
-            <a:pPr lvl="1"/>
-            <a:r>
-              <a:rPr lang="ru-RU" dirty="0"/>
-              <a:t>Постусловия</a:t>
-            </a:r>
-          </a:p>
-          <a:p>
-            <a:pPr lvl="1"/>
-            <a:r>
-              <a:rPr lang="ru-RU" dirty="0"/>
-              <a:t>Инварианты</a:t>
-            </a:r>
-            <a:endParaRPr lang="en-US" dirty="0"/>
+            <a:fld id="{C4166A4A-BC63-4E3E-8737-A1316BCBB6DC}" type="slidenum">
+              <a:rPr lang="en-US" smtClean="0"/>
+              <a:t>25</a:t>
+            </a:fld>
+            <a:endParaRPr lang="en-US"/>
           </a:p>
         </p:txBody>
       </p:sp>
     </p:spTree>
     <p:extLst>
       <p:ext uri="{BB962C8B-B14F-4D97-AF65-F5344CB8AC3E}">
-        <p14:creationId xmlns:p14="http://schemas.microsoft.com/office/powerpoint/2010/main" val="4140748965"/>
+        <p14:creationId xmlns:p14="http://schemas.microsoft.com/office/powerpoint/2010/main" val="2973265757"/>
       </p:ext>
     </p:extLst>
   </p:cSld>
@@ -13571,6 +15788,153 @@
           <a:p>
             <a:r>
               <a:rPr lang="ru-RU" dirty="0"/>
+              <a:t>Контрактное программирование (</a:t>
+            </a:r>
+            <a:r>
+              <a:rPr lang="en-US" dirty="0" err="1"/>
+              <a:t>DbC</a:t>
+            </a:r>
+            <a:r>
+              <a:rPr lang="ru-RU" dirty="0"/>
+              <a:t>)</a:t>
+            </a:r>
+            <a:endParaRPr lang="en-US" dirty="0"/>
+          </a:p>
+          <a:p>
+            <a:pPr lvl="1"/>
+            <a:r>
+              <a:rPr lang="ru-RU" dirty="0"/>
+              <a:t>Предусловия</a:t>
+            </a:r>
+          </a:p>
+          <a:p>
+            <a:pPr lvl="1"/>
+            <a:r>
+              <a:rPr lang="ru-RU" dirty="0"/>
+              <a:t>Постусловия</a:t>
+            </a:r>
+          </a:p>
+          <a:p>
+            <a:pPr lvl="1"/>
+            <a:r>
+              <a:rPr lang="ru-RU" dirty="0"/>
+              <a:t>Инварианты</a:t>
+            </a:r>
+            <a:endParaRPr lang="en-US" dirty="0"/>
+          </a:p>
+        </p:txBody>
+      </p:sp>
+      <p:sp>
+        <p:nvSpPr>
+          <p:cNvPr id="4" name="Slide Number Placeholder 3">
+            <a:extLst>
+              <a:ext uri="{FF2B5EF4-FFF2-40B4-BE49-F238E27FC236}">
+                <a16:creationId xmlns:a16="http://schemas.microsoft.com/office/drawing/2014/main" id="{DB72D4D4-83CC-4914-97FA-4B2ABEE58842}"/>
+              </a:ext>
+            </a:extLst>
+          </p:cNvPr>
+          <p:cNvSpPr>
+            <a:spLocks noGrp="1"/>
+          </p:cNvSpPr>
+          <p:nvPr>
+            <p:ph type="sldNum" sz="quarter" idx="12"/>
+          </p:nvPr>
+        </p:nvSpPr>
+        <p:spPr/>
+        <p:txBody>
+          <a:bodyPr/>
+          <a:lstStyle/>
+          <a:p>
+            <a:fld id="{C4166A4A-BC63-4E3E-8737-A1316BCBB6DC}" type="slidenum">
+              <a:rPr lang="en-US" smtClean="0"/>
+              <a:t>26</a:t>
+            </a:fld>
+            <a:endParaRPr lang="en-US"/>
+          </a:p>
+        </p:txBody>
+      </p:sp>
+    </p:spTree>
+    <p:extLst>
+      <p:ext uri="{BB962C8B-B14F-4D97-AF65-F5344CB8AC3E}">
+        <p14:creationId xmlns:p14="http://schemas.microsoft.com/office/powerpoint/2010/main" val="4140748965"/>
+      </p:ext>
+    </p:extLst>
+  </p:cSld>
+  <p:clrMapOvr>
+    <a:masterClrMapping/>
+  </p:clrMapOvr>
+</p:sld>
+</file>
+
+<file path=ppt/slides/slide27.xml><?xml version="1.0" encoding="utf-8"?>
+<p:sld xmlns:a="http://schemas.openxmlformats.org/drawingml/2006/main" xmlns:r="http://schemas.openxmlformats.org/officeDocument/2006/relationships" xmlns:p="http://schemas.openxmlformats.org/presentationml/2006/main">
+  <p:cSld>
+    <p:spTree>
+      <p:nvGrpSpPr>
+        <p:cNvPr id="1" name=""/>
+        <p:cNvGrpSpPr/>
+        <p:nvPr/>
+      </p:nvGrpSpPr>
+      <p:grpSpPr>
+        <a:xfrm>
+          <a:off x="0" y="0"/>
+          <a:ext cx="0" cy="0"/>
+          <a:chOff x="0" y="0"/>
+          <a:chExt cx="0" cy="0"/>
+        </a:xfrm>
+      </p:grpSpPr>
+      <p:sp>
+        <p:nvSpPr>
+          <p:cNvPr id="2" name="Title 1">
+            <a:extLst>
+              <a:ext uri="{FF2B5EF4-FFF2-40B4-BE49-F238E27FC236}">
+                <a16:creationId xmlns:a16="http://schemas.microsoft.com/office/drawing/2014/main" id="{7BD0C320-E067-40FF-B2EC-0AC2DEF2236C}"/>
+              </a:ext>
+            </a:extLst>
+          </p:cNvPr>
+          <p:cNvSpPr>
+            <a:spLocks noGrp="1"/>
+          </p:cNvSpPr>
+          <p:nvPr>
+            <p:ph type="title"/>
+          </p:nvPr>
+        </p:nvSpPr>
+        <p:spPr/>
+        <p:txBody>
+          <a:bodyPr/>
+          <a:lstStyle/>
+          <a:p>
+            <a:r>
+              <a:rPr lang="ru-RU" dirty="0"/>
+              <a:t>Контракты</a:t>
+            </a:r>
+            <a:endParaRPr lang="en-US" dirty="0"/>
+          </a:p>
+        </p:txBody>
+      </p:sp>
+      <p:sp>
+        <p:nvSpPr>
+          <p:cNvPr id="3" name="Content Placeholder 2">
+            <a:extLst>
+              <a:ext uri="{FF2B5EF4-FFF2-40B4-BE49-F238E27FC236}">
+                <a16:creationId xmlns:a16="http://schemas.microsoft.com/office/drawing/2014/main" id="{6700AE7E-BE5E-4FBB-83C2-2F325B4FB63D}"/>
+              </a:ext>
+            </a:extLst>
+          </p:cNvPr>
+          <p:cNvSpPr>
+            <a:spLocks noGrp="1"/>
+          </p:cNvSpPr>
+          <p:nvPr>
+            <p:ph idx="1"/>
+          </p:nvPr>
+        </p:nvSpPr>
+        <p:spPr/>
+        <p:txBody>
+          <a:bodyPr/>
+          <a:lstStyle/>
+          <a:p>
+            <a:r>
+              <a:rPr lang="ru-RU" dirty="0"/>
               <a:t>Предусловия</a:t>
             </a:r>
             <a:endParaRPr lang="en-US" dirty="0"/>
@@ -14233,6 +16597,35 @@
           </a:p>
         </p:txBody>
       </p:sp>
+      <p:sp>
+        <p:nvSpPr>
+          <p:cNvPr id="4" name="Slide Number Placeholder 3">
+            <a:extLst>
+              <a:ext uri="{FF2B5EF4-FFF2-40B4-BE49-F238E27FC236}">
+                <a16:creationId xmlns:a16="http://schemas.microsoft.com/office/drawing/2014/main" id="{02946787-2AAE-417C-8082-138F056C3290}"/>
+              </a:ext>
+            </a:extLst>
+          </p:cNvPr>
+          <p:cNvSpPr>
+            <a:spLocks noGrp="1"/>
+          </p:cNvSpPr>
+          <p:nvPr>
+            <p:ph type="sldNum" sz="quarter" idx="12"/>
+          </p:nvPr>
+        </p:nvSpPr>
+        <p:spPr/>
+        <p:txBody>
+          <a:bodyPr/>
+          <a:lstStyle/>
+          <a:p>
+            <a:fld id="{C4166A4A-BC63-4E3E-8737-A1316BCBB6DC}" type="slidenum">
+              <a:rPr lang="en-US" smtClean="0"/>
+              <a:t>27</a:t>
+            </a:fld>
+            <a:endParaRPr lang="en-US"/>
+          </a:p>
+        </p:txBody>
+      </p:sp>
     </p:spTree>
     <p:extLst>
       <p:ext uri="{BB962C8B-B14F-4D97-AF65-F5344CB8AC3E}">
@@ -14246,7 +16639,7 @@
 </p:sld>
 </file>
 
-<file path=ppt/slides/slide27.xml><?xml version="1.0" encoding="utf-8"?>
+<file path=ppt/slides/slide28.xml><?xml version="1.0" encoding="utf-8"?>
 <p:sld xmlns:a="http://schemas.openxmlformats.org/drawingml/2006/main" xmlns:r="http://schemas.openxmlformats.org/officeDocument/2006/relationships" xmlns:p="http://schemas.openxmlformats.org/presentationml/2006/main">
   <p:cSld>
     <p:spTree>
@@ -14427,6 +16820,35 @@
           </a:p>
         </p:txBody>
       </p:sp>
+      <p:sp>
+        <p:nvSpPr>
+          <p:cNvPr id="4" name="Slide Number Placeholder 3">
+            <a:extLst>
+              <a:ext uri="{FF2B5EF4-FFF2-40B4-BE49-F238E27FC236}">
+                <a16:creationId xmlns:a16="http://schemas.microsoft.com/office/drawing/2014/main" id="{42B00E63-1622-4425-8F51-A99436116994}"/>
+              </a:ext>
+            </a:extLst>
+          </p:cNvPr>
+          <p:cNvSpPr>
+            <a:spLocks noGrp="1"/>
+          </p:cNvSpPr>
+          <p:nvPr>
+            <p:ph type="sldNum" sz="quarter" idx="12"/>
+          </p:nvPr>
+        </p:nvSpPr>
+        <p:spPr/>
+        <p:txBody>
+          <a:bodyPr/>
+          <a:lstStyle/>
+          <a:p>
+            <a:fld id="{C4166A4A-BC63-4E3E-8737-A1316BCBB6DC}" type="slidenum">
+              <a:rPr lang="en-US" smtClean="0"/>
+              <a:t>28</a:t>
+            </a:fld>
+            <a:endParaRPr lang="en-US"/>
+          </a:p>
+        </p:txBody>
+      </p:sp>
     </p:spTree>
     <p:extLst>
       <p:ext uri="{BB962C8B-B14F-4D97-AF65-F5344CB8AC3E}">
@@ -14440,7 +16862,7 @@
 </p:sld>
 </file>
 
-<file path=ppt/slides/slide28.xml><?xml version="1.0" encoding="utf-8"?>
+<file path=ppt/slides/slide29.xml><?xml version="1.0" encoding="utf-8"?>
 <p:sld xmlns:a="http://schemas.openxmlformats.org/drawingml/2006/main" xmlns:r="http://schemas.openxmlformats.org/officeDocument/2006/relationships" xmlns:p="http://schemas.openxmlformats.org/presentationml/2006/main">
   <p:cSld>
     <p:spTree>
@@ -14627,6 +17049,35 @@
           </a:p>
           <a:p>
             <a:endParaRPr lang="en-US" dirty="0"/>
+          </a:p>
+        </p:txBody>
+      </p:sp>
+      <p:sp>
+        <p:nvSpPr>
+          <p:cNvPr id="4" name="Slide Number Placeholder 3">
+            <a:extLst>
+              <a:ext uri="{FF2B5EF4-FFF2-40B4-BE49-F238E27FC236}">
+                <a16:creationId xmlns:a16="http://schemas.microsoft.com/office/drawing/2014/main" id="{1359981B-B7A2-4488-85CB-922B163F9724}"/>
+              </a:ext>
+            </a:extLst>
+          </p:cNvPr>
+          <p:cNvSpPr>
+            <a:spLocks noGrp="1"/>
+          </p:cNvSpPr>
+          <p:nvPr>
+            <p:ph type="sldNum" sz="quarter" idx="12"/>
+          </p:nvPr>
+        </p:nvSpPr>
+        <p:spPr/>
+        <p:txBody>
+          <a:bodyPr/>
+          <a:lstStyle/>
+          <a:p>
+            <a:fld id="{C4166A4A-BC63-4E3E-8737-A1316BCBB6DC}" type="slidenum">
+              <a:rPr lang="en-US" smtClean="0"/>
+              <a:t>29</a:t>
+            </a:fld>
+            <a:endParaRPr lang="en-US"/>
           </a:p>
         </p:txBody>
       </p:sp>
@@ -14712,7 +17163,7 @@
           <a:p>
             <a:r>
               <a:rPr lang="ru-RU" dirty="0"/>
-              <a:t>Почему безопасность и стабильность программного обеспечения актуальна для </a:t>
+              <a:t>Почему безопасность и стабильность программного обеспечения так актуальна для </a:t>
             </a:r>
             <a:r>
               <a:rPr lang="en-US" dirty="0"/>
@@ -14722,6 +17173,76 @@
           <a:p>
             <a:pPr lvl="1"/>
             <a:r>
+              <a:rPr lang="en-US" dirty="0"/>
+              <a:t>70% </a:t>
+            </a:r>
+            <a:r>
+              <a:rPr lang="ru-RU" dirty="0"/>
+              <a:t>ошибок в </a:t>
+            </a:r>
+            <a:r>
+              <a:rPr lang="en-US" dirty="0"/>
+              <a:t>Microsoft </a:t>
+            </a:r>
+            <a:r>
+              <a:rPr lang="ru-RU" dirty="0"/>
+              <a:t>и </a:t>
+            </a:r>
+            <a:r>
+              <a:rPr lang="en-US" dirty="0"/>
+              <a:t>Google</a:t>
+            </a:r>
+            <a:r>
+              <a:rPr lang="ru-RU" dirty="0"/>
+              <a:t> </a:t>
+            </a:r>
+            <a:r>
+              <a:rPr lang="en-US" dirty="0"/>
+              <a:t>Chrome</a:t>
+            </a:r>
+            <a:r>
+              <a:rPr lang="ru-RU" dirty="0"/>
+              <a:t> </a:t>
+            </a:r>
+            <a:r>
+              <a:rPr lang="en-US" dirty="0"/>
+              <a:t> – </a:t>
+            </a:r>
+            <a:r>
+              <a:rPr lang="ru-RU" dirty="0"/>
+              <a:t>ошибки памяти</a:t>
+            </a:r>
+          </a:p>
+          <a:p>
+            <a:pPr lvl="1"/>
+            <a:r>
+              <a:rPr lang="en-US" dirty="0"/>
+              <a:t>70% </a:t>
+            </a:r>
+            <a:r>
+              <a:rPr lang="ru-RU" dirty="0"/>
+              <a:t>ошибок</a:t>
+            </a:r>
+            <a:r>
+              <a:rPr lang="en-US" dirty="0"/>
+              <a:t> </a:t>
+            </a:r>
+            <a:r>
+              <a:rPr lang="ru-RU" dirty="0"/>
+              <a:t>памяти – 0-</a:t>
+            </a:r>
+            <a:r>
+              <a:rPr lang="en-US" dirty="0"/>
+              <a:t>day </a:t>
+            </a:r>
+            <a:r>
+              <a:rPr lang="ru-RU" dirty="0"/>
+              <a:t>уязвимости</a:t>
+            </a:r>
+          </a:p>
+          <a:p>
+            <a:pPr lvl="1"/>
+            <a:r>
               <a:rPr lang="ru-RU" dirty="0"/>
               <a:t>Появление новых более безопасных языков</a:t>
             </a:r>
@@ -14730,79 +17251,8 @@
           <a:p>
             <a:pPr lvl="1"/>
             <a:r>
-              <a:rPr lang="en-US" dirty="0"/>
-              <a:t>70% </a:t>
-            </a:r>
-            <a:r>
               <a:rPr lang="ru-RU" dirty="0"/>
-              <a:t>ошибок в </a:t>
-            </a:r>
-            <a:r>
-              <a:rPr lang="en-US" dirty="0"/>
-              <a:t>Microsoft </a:t>
-            </a:r>
-            <a:r>
-              <a:rPr lang="ru-RU" dirty="0"/>
-              <a:t>и </a:t>
-            </a:r>
-            <a:r>
-              <a:rPr lang="en-US" dirty="0"/>
-              <a:t>Google</a:t>
-            </a:r>
-            <a:r>
-              <a:rPr lang="ru-RU" dirty="0"/>
-              <a:t> </a:t>
-            </a:r>
-            <a:r>
-              <a:rPr lang="en-US" dirty="0"/>
-              <a:t>Chrome</a:t>
-            </a:r>
-            <a:r>
-              <a:rPr lang="ru-RU" dirty="0"/>
-              <a:t> </a:t>
-            </a:r>
-            <a:r>
-              <a:rPr lang="en-US" dirty="0"/>
-              <a:t> – </a:t>
-            </a:r>
-            <a:r>
-              <a:rPr lang="ru-RU" dirty="0"/>
-              <a:t>ошибки памяти</a:t>
-            </a:r>
-          </a:p>
-          <a:p>
-            <a:pPr lvl="1"/>
-            <a:r>
-              <a:rPr lang="en-US" dirty="0"/>
-              <a:t>70% </a:t>
-            </a:r>
-            <a:r>
-              <a:rPr lang="ru-RU" dirty="0"/>
-              <a:t>ошибок</a:t>
-            </a:r>
-            <a:r>
-              <a:rPr lang="en-US" dirty="0"/>
-              <a:t> </a:t>
-            </a:r>
-            <a:r>
-              <a:rPr lang="ru-RU" dirty="0"/>
-              <a:t>памяти – 0-</a:t>
-            </a:r>
-            <a:r>
-              <a:rPr lang="en-US" dirty="0"/>
-              <a:t>day </a:t>
-            </a:r>
-            <a:r>
-              <a:rPr lang="ru-RU" dirty="0"/>
-              <a:t>уязвимости</a:t>
-            </a:r>
-            <a:endParaRPr lang="en-US" dirty="0"/>
-          </a:p>
-          <a:p>
-            <a:pPr lvl="1"/>
-            <a:r>
-              <a:rPr lang="ru-RU" dirty="0"/>
-              <a:t>Гос. заказчики различных стран рекомендуют обязательное использование </a:t>
+              <a:t>Гос. заказчики различных стран рекомендуют использовать </a:t>
             </a:r>
             <a:r>
               <a:rPr lang="en-US" dirty="0"/>
@@ -14812,7 +17262,39 @@
               <a:rPr lang="ru-RU" dirty="0"/>
               <a:t>или безопасных языков</a:t>
             </a:r>
+          </a:p>
+          <a:p>
+            <a:pPr lvl="1"/>
             <a:endParaRPr lang="en-US" dirty="0"/>
+          </a:p>
+        </p:txBody>
+      </p:sp>
+      <p:sp>
+        <p:nvSpPr>
+          <p:cNvPr id="4" name="Slide Number Placeholder 3">
+            <a:extLst>
+              <a:ext uri="{FF2B5EF4-FFF2-40B4-BE49-F238E27FC236}">
+                <a16:creationId xmlns:a16="http://schemas.microsoft.com/office/drawing/2014/main" id="{EB30F434-6952-419D-862E-675C6F5D646E}"/>
+              </a:ext>
+            </a:extLst>
+          </p:cNvPr>
+          <p:cNvSpPr>
+            <a:spLocks noGrp="1"/>
+          </p:cNvSpPr>
+          <p:nvPr>
+            <p:ph type="sldNum" sz="quarter" idx="12"/>
+          </p:nvPr>
+        </p:nvSpPr>
+        <p:spPr/>
+        <p:txBody>
+          <a:bodyPr/>
+          <a:lstStyle/>
+          <a:p>
+            <a:fld id="{C4166A4A-BC63-4E3E-8737-A1316BCBB6DC}" type="slidenum">
+              <a:rPr lang="en-US" smtClean="0"/>
+              <a:t>3</a:t>
+            </a:fld>
+            <a:endParaRPr lang="en-US"/>
           </a:p>
         </p:txBody>
       </p:sp>
@@ -14820,6 +17302,258 @@
     <p:extLst>
       <p:ext uri="{BB962C8B-B14F-4D97-AF65-F5344CB8AC3E}">
         <p14:creationId xmlns:p14="http://schemas.microsoft.com/office/powerpoint/2010/main" val="3356559640"/>
+      </p:ext>
+    </p:extLst>
+  </p:cSld>
+  <p:clrMapOvr>
+    <a:masterClrMapping/>
+  </p:clrMapOvr>
+</p:sld>
+</file>
+
+<file path=ppt/slides/slide30.xml><?xml version="1.0" encoding="utf-8"?>
+<p:sld xmlns:a="http://schemas.openxmlformats.org/drawingml/2006/main" xmlns:r="http://schemas.openxmlformats.org/officeDocument/2006/relationships" xmlns:p="http://schemas.openxmlformats.org/presentationml/2006/main">
+  <p:cSld>
+    <p:spTree>
+      <p:nvGrpSpPr>
+        <p:cNvPr id="1" name=""/>
+        <p:cNvGrpSpPr/>
+        <p:nvPr/>
+      </p:nvGrpSpPr>
+      <p:grpSpPr>
+        <a:xfrm>
+          <a:off x="0" y="0"/>
+          <a:ext cx="0" cy="0"/>
+          <a:chOff x="0" y="0"/>
+          <a:chExt cx="0" cy="0"/>
+        </a:xfrm>
+      </p:grpSpPr>
+      <p:sp>
+        <p:nvSpPr>
+          <p:cNvPr id="2" name="Title 1">
+            <a:extLst>
+              <a:ext uri="{FF2B5EF4-FFF2-40B4-BE49-F238E27FC236}">
+                <a16:creationId xmlns:a16="http://schemas.microsoft.com/office/drawing/2014/main" id="{76D95E12-9E9C-443F-8963-97370016A706}"/>
+              </a:ext>
+            </a:extLst>
+          </p:cNvPr>
+          <p:cNvSpPr>
+            <a:spLocks noGrp="1"/>
+          </p:cNvSpPr>
+          <p:nvPr>
+            <p:ph type="title"/>
+          </p:nvPr>
+        </p:nvSpPr>
+        <p:spPr/>
+        <p:txBody>
+          <a:bodyPr/>
+          <a:lstStyle/>
+          <a:p>
+            <a:r>
+              <a:rPr lang="ru-RU" dirty="0"/>
+              <a:t>Что включать у себя?</a:t>
+            </a:r>
+            <a:endParaRPr lang="en-US" dirty="0"/>
+          </a:p>
+        </p:txBody>
+      </p:sp>
+      <p:sp>
+        <p:nvSpPr>
+          <p:cNvPr id="3" name="Content Placeholder 2">
+            <a:extLst>
+              <a:ext uri="{FF2B5EF4-FFF2-40B4-BE49-F238E27FC236}">
+                <a16:creationId xmlns:a16="http://schemas.microsoft.com/office/drawing/2014/main" id="{DCF3428E-C04D-4DE8-A4B8-60C5E7203274}"/>
+              </a:ext>
+            </a:extLst>
+          </p:cNvPr>
+          <p:cNvSpPr>
+            <a:spLocks noGrp="1"/>
+          </p:cNvSpPr>
+          <p:nvPr>
+            <p:ph idx="1"/>
+          </p:nvPr>
+        </p:nvSpPr>
+        <p:spPr/>
+        <p:txBody>
+          <a:bodyPr/>
+          <a:lstStyle/>
+          <a:p>
+            <a:r>
+              <a:rPr lang="en-US" dirty="0"/>
+              <a:t>ASLR (-</a:t>
+            </a:r>
+            <a:r>
+              <a:rPr lang="en-US" dirty="0" err="1"/>
+              <a:t>fpie</a:t>
+            </a:r>
+            <a:r>
+              <a:rPr lang="en-US" dirty="0"/>
+              <a:t>)</a:t>
+            </a:r>
+            <a:endParaRPr lang="ru-RU" dirty="0"/>
+          </a:p>
+          <a:p>
+            <a:r>
+              <a:rPr lang="en-US" dirty="0"/>
+              <a:t>Stack Protector (-</a:t>
+            </a:r>
+            <a:r>
+              <a:rPr lang="en-US" dirty="0" err="1"/>
+              <a:t>fstack</a:t>
+            </a:r>
+            <a:r>
+              <a:rPr lang="en-US" dirty="0"/>
+              <a:t>-protector-strong)</a:t>
+            </a:r>
+          </a:p>
+          <a:p>
+            <a:r>
+              <a:rPr lang="ru-RU" dirty="0"/>
+              <a:t>Фортификация (-</a:t>
+            </a:r>
+            <a:r>
+              <a:rPr lang="en-US" dirty="0"/>
+              <a:t>D_FORTIFY_SOURCE=3)</a:t>
+            </a:r>
+          </a:p>
+          <a:p>
+            <a:r>
+              <a:rPr lang="en-US" dirty="0"/>
+              <a:t>Full RELRO (-</a:t>
+            </a:r>
+            <a:r>
+              <a:rPr lang="en-US" dirty="0" err="1"/>
+              <a:t>Wl</a:t>
+            </a:r>
+            <a:r>
+              <a:rPr lang="en-US" dirty="0"/>
+              <a:t>,-</a:t>
+            </a:r>
+            <a:r>
+              <a:rPr lang="en-US" dirty="0" err="1"/>
+              <a:t>z,relro</a:t>
+            </a:r>
+            <a:r>
+              <a:rPr lang="en-US" dirty="0"/>
+              <a:t> -</a:t>
+            </a:r>
+            <a:r>
+              <a:rPr lang="en-US" dirty="0" err="1"/>
+              <a:t>Wl</a:t>
+            </a:r>
+            <a:r>
+              <a:rPr lang="en-US" dirty="0"/>
+              <a:t>,-</a:t>
+            </a:r>
+            <a:r>
+              <a:rPr lang="en-US" dirty="0" err="1"/>
+              <a:t>z,now</a:t>
+            </a:r>
+            <a:r>
+              <a:rPr lang="en-US" dirty="0"/>
+              <a:t>)</a:t>
+            </a:r>
+          </a:p>
+          <a:p>
+            <a:r>
+              <a:rPr lang="ru-RU" dirty="0"/>
+              <a:t>Защита от </a:t>
+            </a:r>
+            <a:r>
+              <a:rPr lang="en-US" dirty="0"/>
+              <a:t>Stack Clash</a:t>
+            </a:r>
+            <a:r>
+              <a:rPr lang="ru-RU" dirty="0"/>
+              <a:t> </a:t>
+            </a:r>
+            <a:r>
+              <a:rPr lang="en-US" dirty="0"/>
+              <a:t>(-</a:t>
+            </a:r>
+            <a:r>
+              <a:rPr lang="en-US" dirty="0" err="1"/>
+              <a:t>fstack</a:t>
+            </a:r>
+            <a:r>
+              <a:rPr lang="en-US" dirty="0"/>
+              <a:t>-clash-protection)</a:t>
+            </a:r>
+            <a:endParaRPr lang="ru-RU" dirty="0"/>
+          </a:p>
+          <a:p>
+            <a:r>
+              <a:rPr lang="en-US" dirty="0"/>
+              <a:t>Control-flow Integrity (-</a:t>
+            </a:r>
+            <a:r>
+              <a:rPr lang="en-US" dirty="0" err="1"/>
+              <a:t>fcf</a:t>
+            </a:r>
+            <a:r>
+              <a:rPr lang="en-US" dirty="0"/>
+              <a:t>-protection </a:t>
+            </a:r>
+            <a:r>
+              <a:rPr lang="ru-RU" dirty="0"/>
+              <a:t>на </a:t>
+            </a:r>
+            <a:r>
+              <a:rPr lang="en-US" dirty="0"/>
+              <a:t>X86, -</a:t>
+            </a:r>
+            <a:r>
+              <a:rPr lang="en-US" dirty="0" err="1"/>
+              <a:t>mbranch</a:t>
+            </a:r>
+            <a:r>
+              <a:rPr lang="en-US" dirty="0"/>
+              <a:t>-protection </a:t>
+            </a:r>
+            <a:r>
+              <a:rPr lang="ru-RU" dirty="0"/>
+              <a:t>на </a:t>
+            </a:r>
+            <a:r>
+              <a:rPr lang="en-US" dirty="0"/>
+              <a:t>AArch64)</a:t>
+            </a:r>
+          </a:p>
+        </p:txBody>
+      </p:sp>
+      <p:sp>
+        <p:nvSpPr>
+          <p:cNvPr id="4" name="Slide Number Placeholder 3">
+            <a:extLst>
+              <a:ext uri="{FF2B5EF4-FFF2-40B4-BE49-F238E27FC236}">
+                <a16:creationId xmlns:a16="http://schemas.microsoft.com/office/drawing/2014/main" id="{BF45DC3E-752F-4191-9D7C-BE076D914A16}"/>
+              </a:ext>
+            </a:extLst>
+          </p:cNvPr>
+          <p:cNvSpPr>
+            <a:spLocks noGrp="1"/>
+          </p:cNvSpPr>
+          <p:nvPr>
+            <p:ph type="sldNum" sz="quarter" idx="12"/>
+          </p:nvPr>
+        </p:nvSpPr>
+        <p:spPr/>
+        <p:txBody>
+          <a:bodyPr/>
+          <a:lstStyle/>
+          <a:p>
+            <a:fld id="{C4166A4A-BC63-4E3E-8737-A1316BCBB6DC}" type="slidenum">
+              <a:rPr lang="en-US" smtClean="0"/>
+              <a:t>30</a:t>
+            </a:fld>
+            <a:endParaRPr lang="en-US"/>
+          </a:p>
+        </p:txBody>
+      </p:sp>
+    </p:spTree>
+    <p:extLst>
+      <p:ext uri="{BB962C8B-B14F-4D97-AF65-F5344CB8AC3E}">
+        <p14:creationId xmlns:p14="http://schemas.microsoft.com/office/powerpoint/2010/main" val="345651356"/>
       </p:ext>
     </p:extLst>
   </p:cSld>
@@ -14869,7 +17603,7 @@
           <a:p>
             <a:r>
               <a:rPr lang="ru-RU" dirty="0"/>
-              <a:t>Цель доклада</a:t>
+              <a:t>Введение</a:t>
             </a:r>
             <a:endParaRPr lang="en-US" dirty="0"/>
           </a:p>
@@ -14896,6 +17630,19 @@
           <a:bodyPr/>
           <a:lstStyle/>
           <a:p>
+            <a:pPr marL="0" indent="0">
+              <a:buNone/>
+            </a:pPr>
+            <a:r>
+              <a:rPr lang="ru-RU" sz="3200" dirty="0"/>
+              <a:t>Цель</a:t>
+            </a:r>
+            <a:endParaRPr lang="ru-RU" dirty="0"/>
+          </a:p>
+          <a:p>
+            <a:endParaRPr lang="ru-RU" dirty="0"/>
+          </a:p>
+          <a:p>
             <a:r>
               <a:rPr lang="ru-RU" dirty="0"/>
               <a:t>Детальный обзор типов </a:t>
@@ -14934,7 +17681,7 @@
           <a:p>
             <a:r>
               <a:rPr lang="ru-RU" dirty="0"/>
-              <a:t>Накладные расходы на использование </a:t>
+              <a:t>Накладные расходны на использование </a:t>
             </a:r>
             <a:r>
               <a:rPr lang="en-US" dirty="0"/>
@@ -14951,6 +17698,35 @@
               <a:rPr lang="en-US" dirty="0"/>
               <a:t>hardening</a:t>
             </a:r>
+          </a:p>
+        </p:txBody>
+      </p:sp>
+      <p:sp>
+        <p:nvSpPr>
+          <p:cNvPr id="4" name="Slide Number Placeholder 3">
+            <a:extLst>
+              <a:ext uri="{FF2B5EF4-FFF2-40B4-BE49-F238E27FC236}">
+                <a16:creationId xmlns:a16="http://schemas.microsoft.com/office/drawing/2014/main" id="{BD576147-3437-4A87-944C-ED3A2CA4BA9D}"/>
+              </a:ext>
+            </a:extLst>
+          </p:cNvPr>
+          <p:cNvSpPr>
+            <a:spLocks noGrp="1"/>
+          </p:cNvSpPr>
+          <p:nvPr>
+            <p:ph type="sldNum" sz="quarter" idx="12"/>
+          </p:nvPr>
+        </p:nvSpPr>
+        <p:spPr/>
+        <p:txBody>
+          <a:bodyPr/>
+          <a:lstStyle/>
+          <a:p>
+            <a:fld id="{C4166A4A-BC63-4E3E-8737-A1316BCBB6DC}" type="slidenum">
+              <a:rPr lang="en-US" smtClean="0"/>
+              <a:t>4</a:t>
+            </a:fld>
+            <a:endParaRPr lang="en-US"/>
           </a:p>
         </p:txBody>
       </p:sp>
@@ -15061,8 +17837,13 @@
           <a:p>
             <a:r>
               <a:rPr lang="ru-RU" dirty="0"/>
-              <a:t>Детальный обзор имеющихся средств</a:t>
-            </a:r>
+              <a:t>Детальный обзор имеющихся средств </a:t>
+            </a:r>
+            <a:r>
+              <a:rPr lang="en-US" dirty="0"/>
+              <a:t>hardening</a:t>
+            </a:r>
+            <a:endParaRPr lang="ru-RU" dirty="0"/>
           </a:p>
           <a:p>
             <a:r>
@@ -15070,6 +17851,35 @@
               <a:t>Дальнейшее развитие в Стандарте языка</a:t>
             </a:r>
             <a:endParaRPr lang="en-US" dirty="0"/>
+          </a:p>
+        </p:txBody>
+      </p:sp>
+      <p:sp>
+        <p:nvSpPr>
+          <p:cNvPr id="4" name="Slide Number Placeholder 3">
+            <a:extLst>
+              <a:ext uri="{FF2B5EF4-FFF2-40B4-BE49-F238E27FC236}">
+                <a16:creationId xmlns:a16="http://schemas.microsoft.com/office/drawing/2014/main" id="{A5D2BE94-5CCE-4FF9-857C-F10F0ADEA259}"/>
+              </a:ext>
+            </a:extLst>
+          </p:cNvPr>
+          <p:cNvSpPr>
+            <a:spLocks noGrp="1"/>
+          </p:cNvSpPr>
+          <p:nvPr>
+            <p:ph type="sldNum" sz="quarter" idx="12"/>
+          </p:nvPr>
+        </p:nvSpPr>
+        <p:spPr/>
+        <p:txBody>
+          <a:bodyPr/>
+          <a:lstStyle/>
+          <a:p>
+            <a:fld id="{C4166A4A-BC63-4E3E-8737-A1316BCBB6DC}" type="slidenum">
+              <a:rPr lang="en-US" smtClean="0"/>
+              <a:t>5</a:t>
+            </a:fld>
+            <a:endParaRPr lang="en-US"/>
           </a:p>
         </p:txBody>
       </p:sp>
@@ -15135,6 +17945,35 @@
           </a:p>
         </p:txBody>
       </p:sp>
+      <p:sp>
+        <p:nvSpPr>
+          <p:cNvPr id="3" name="Slide Number Placeholder 2">
+            <a:extLst>
+              <a:ext uri="{FF2B5EF4-FFF2-40B4-BE49-F238E27FC236}">
+                <a16:creationId xmlns:a16="http://schemas.microsoft.com/office/drawing/2014/main" id="{7253D22A-9954-4B3E-A5C6-643AE3AC6A43}"/>
+              </a:ext>
+            </a:extLst>
+          </p:cNvPr>
+          <p:cNvSpPr>
+            <a:spLocks noGrp="1"/>
+          </p:cNvSpPr>
+          <p:nvPr>
+            <p:ph type="sldNum" sz="quarter" idx="12"/>
+          </p:nvPr>
+        </p:nvSpPr>
+        <p:spPr/>
+        <p:txBody>
+          <a:bodyPr/>
+          <a:lstStyle/>
+          <a:p>
+            <a:fld id="{C4166A4A-BC63-4E3E-8737-A1316BCBB6DC}" type="slidenum">
+              <a:rPr lang="en-US" smtClean="0"/>
+              <a:t>6</a:t>
+            </a:fld>
+            <a:endParaRPr lang="en-US"/>
+          </a:p>
+        </p:txBody>
+      </p:sp>
     </p:spTree>
     <p:extLst>
       <p:ext uri="{BB962C8B-B14F-4D97-AF65-F5344CB8AC3E}">
@@ -15235,6 +18074,35 @@
               <a:t>Проверки в рантайме (компилятор, библиотеки, ядро)</a:t>
             </a:r>
             <a:endParaRPr lang="en-US" dirty="0"/>
+          </a:p>
+        </p:txBody>
+      </p:sp>
+      <p:sp>
+        <p:nvSpPr>
+          <p:cNvPr id="4" name="Slide Number Placeholder 3">
+            <a:extLst>
+              <a:ext uri="{FF2B5EF4-FFF2-40B4-BE49-F238E27FC236}">
+                <a16:creationId xmlns:a16="http://schemas.microsoft.com/office/drawing/2014/main" id="{C764EC23-F60C-4711-A5BE-8AC7C6C7DD26}"/>
+              </a:ext>
+            </a:extLst>
+          </p:cNvPr>
+          <p:cNvSpPr>
+            <a:spLocks noGrp="1"/>
+          </p:cNvSpPr>
+          <p:nvPr>
+            <p:ph type="sldNum" sz="quarter" idx="12"/>
+          </p:nvPr>
+        </p:nvSpPr>
+        <p:spPr/>
+        <p:txBody>
+          <a:bodyPr/>
+          <a:lstStyle/>
+          <a:p>
+            <a:fld id="{C4166A4A-BC63-4E3E-8737-A1316BCBB6DC}" type="slidenum">
+              <a:rPr lang="en-US" smtClean="0"/>
+              <a:t>7</a:t>
+            </a:fld>
+            <a:endParaRPr lang="en-US"/>
           </a:p>
         </p:txBody>
       </p:sp>
@@ -15396,7 +18264,7 @@
             </a:r>
             <a:r>
               <a:rPr lang="en-US" dirty="0"/>
-              <a:t> –</a:t>
+              <a:t> -</a:t>
             </a:r>
             <a:r>
               <a:rPr lang="en-US" dirty="0" err="1"/>
@@ -15464,6 +18332,90 @@
               <a:t>Контракты</a:t>
             </a:r>
             <a:endParaRPr lang="en-US" dirty="0"/>
+          </a:p>
+        </p:txBody>
+      </p:sp>
+      <p:sp>
+        <p:nvSpPr>
+          <p:cNvPr id="4" name="TextBox 3">
+            <a:extLst>
+              <a:ext uri="{FF2B5EF4-FFF2-40B4-BE49-F238E27FC236}">
+                <a16:creationId xmlns:a16="http://schemas.microsoft.com/office/drawing/2014/main" id="{E559EDE0-50EB-49F6-97C1-53B4F7440152}"/>
+              </a:ext>
+            </a:extLst>
+          </p:cNvPr>
+          <p:cNvSpPr txBox="1"/>
+          <p:nvPr/>
+        </p:nvSpPr>
+        <p:spPr>
+          <a:xfrm>
+            <a:off x="7810151" y="5620624"/>
+            <a:ext cx="2704202" cy="369332"/>
+          </a:xfrm>
+          <a:prstGeom prst="rect">
+            <a:avLst/>
+          </a:prstGeom>
+          <a:noFill/>
+        </p:spPr>
+        <p:txBody>
+          <a:bodyPr wrap="none" rtlCol="0">
+            <a:spAutoFit/>
+          </a:bodyPr>
+          <a:lstStyle/>
+          <a:p>
+            <a:r>
+              <a:rPr lang="en-US" dirty="0">
+                <a:solidFill>
+                  <a:srgbClr val="FF0000"/>
+                </a:solidFill>
+              </a:rPr>
+              <a:t>TODO: </a:t>
+            </a:r>
+            <a:r>
+              <a:rPr lang="ru-RU" dirty="0">
+                <a:solidFill>
+                  <a:srgbClr val="FF0000"/>
+                </a:solidFill>
+              </a:rPr>
+              <a:t>упомянуть </a:t>
+            </a:r>
+            <a:r>
+              <a:rPr lang="en-US" dirty="0">
+                <a:solidFill>
+                  <a:srgbClr val="FF0000"/>
+                </a:solidFill>
+              </a:rPr>
+              <a:t>Annex K</a:t>
+            </a:r>
+          </a:p>
+        </p:txBody>
+      </p:sp>
+      <p:sp>
+        <p:nvSpPr>
+          <p:cNvPr id="5" name="Slide Number Placeholder 4">
+            <a:extLst>
+              <a:ext uri="{FF2B5EF4-FFF2-40B4-BE49-F238E27FC236}">
+                <a16:creationId xmlns:a16="http://schemas.microsoft.com/office/drawing/2014/main" id="{DE16F965-96C7-4288-9E1E-F51293331A1B}"/>
+              </a:ext>
+            </a:extLst>
+          </p:cNvPr>
+          <p:cNvSpPr>
+            <a:spLocks noGrp="1"/>
+          </p:cNvSpPr>
+          <p:nvPr>
+            <p:ph type="sldNum" sz="quarter" idx="12"/>
+          </p:nvPr>
+        </p:nvSpPr>
+        <p:spPr/>
+        <p:txBody>
+          <a:bodyPr/>
+          <a:lstStyle/>
+          <a:p>
+            <a:fld id="{C4166A4A-BC63-4E3E-8737-A1316BCBB6DC}" type="slidenum">
+              <a:rPr lang="en-US" smtClean="0"/>
+              <a:t>8</a:t>
+            </a:fld>
+            <a:endParaRPr lang="en-US"/>
           </a:p>
         </p:txBody>
       </p:sp>
@@ -15549,7 +18501,7 @@
           <a:p>
             <a:r>
               <a:rPr lang="ru-RU" dirty="0"/>
-              <a:t>Удалять всю информацию о символах из бинарника (опция линкера </a:t>
+              <a:t>Удалять всю информацию о символах из исполняемого файла (опция линкера </a:t>
             </a:r>
             <a:r>
               <a:rPr lang="en-US" dirty="0"/>
@@ -15577,6 +18529,35 @@
           </a:p>
           <a:p>
             <a:endParaRPr lang="en-US" dirty="0"/>
+          </a:p>
+        </p:txBody>
+      </p:sp>
+      <p:sp>
+        <p:nvSpPr>
+          <p:cNvPr id="4" name="Slide Number Placeholder 3">
+            <a:extLst>
+              <a:ext uri="{FF2B5EF4-FFF2-40B4-BE49-F238E27FC236}">
+                <a16:creationId xmlns:a16="http://schemas.microsoft.com/office/drawing/2014/main" id="{478D2D99-B9ED-49CE-95B4-1CC9184C223B}"/>
+              </a:ext>
+            </a:extLst>
+          </p:cNvPr>
+          <p:cNvSpPr>
+            <a:spLocks noGrp="1"/>
+          </p:cNvSpPr>
+          <p:nvPr>
+            <p:ph type="sldNum" sz="quarter" idx="12"/>
+          </p:nvPr>
+        </p:nvSpPr>
+        <p:spPr/>
+        <p:txBody>
+          <a:bodyPr/>
+          <a:lstStyle/>
+          <a:p>
+            <a:fld id="{C4166A4A-BC63-4E3E-8737-A1316BCBB6DC}" type="slidenum">
+              <a:rPr lang="en-US" smtClean="0"/>
+              <a:t>9</a:t>
+            </a:fld>
+            <a:endParaRPr lang="en-US"/>
           </a:p>
         </p:txBody>
       </p:sp>
@@ -15886,4 +18867,299 @@
     </a:ext>
   </a:extLst>
 </a:theme>
+</file>
+
+<file path=ppt/theme/theme2.xml><?xml version="1.0" encoding="utf-8"?>
+<a:theme xmlns:a="http://schemas.openxmlformats.org/drawingml/2006/main" name="Office Theme">
+  <a:themeElements>
+    <a:clrScheme name="Office">
+      <a:dk1>
+        <a:sysClr val="windowText" lastClr="000000"/>
+      </a:dk1>
+      <a:lt1>
+        <a:sysClr val="window" lastClr="FFFFFF"/>
+      </a:lt1>
+      <a:dk2>
+        <a:srgbClr val="44546A"/>
+      </a:dk2>
+      <a:lt2>
+        <a:srgbClr val="E7E6E6"/>
+      </a:lt2>
+      <a:accent1>
+        <a:srgbClr val="4472C4"/>
+      </a:accent1>
+      <a:accent2>
+        <a:srgbClr val="ED7D31"/>
+      </a:accent2>
+      <a:accent3>
+        <a:srgbClr val="A5A5A5"/>
+      </a:accent3>
+      <a:accent4>
+        <a:srgbClr val="FFC000"/>
+      </a:accent4>
+      <a:accent5>
+        <a:srgbClr val="5B9BD5"/>
+      </a:accent5>
+      <a:accent6>
+        <a:srgbClr val="70AD47"/>
+      </a:accent6>
+      <a:hlink>
+        <a:srgbClr val="0563C1"/>
+      </a:hlink>
+      <a:folHlink>
+        <a:srgbClr val="954F72"/>
+      </a:folHlink>
+    </a:clrScheme>
+    <a:fontScheme name="Office">
+      <a:majorFont>
+        <a:latin typeface="Calibri Light" panose="020F0302020204030204"/>
+        <a:ea typeface=""/>
+        <a:cs typeface=""/>
+        <a:font script="Jpan" typeface="游ゴシック Light"/>
+        <a:font script="Hang" typeface="맑은 고딕"/>
+        <a:font script="Hans" typeface="等线 Light"/>
+        <a:font script="Hant" typeface="新細明體"/>
+        <a:font script="Arab" typeface="Times New Roman"/>
+        <a:font script="Hebr" typeface="Times New Roman"/>
+        <a:font script="Thai" typeface="Angsana New"/>
+        <a:font script="Ethi" typeface="Nyala"/>
+        <a:font script="Beng" typeface="Vrinda"/>
+        <a:font script="Gujr" typeface="Shruti"/>
+        <a:font script="Khmr" typeface="MoolBoran"/>
+        <a:font script="Knda" typeface="Tunga"/>
+        <a:font script="Guru" typeface="Raavi"/>
+        <a:font script="Cans" typeface="Euphemia"/>
+        <a:font script="Cher" typeface="Plantagenet Cherokee"/>
+        <a:font script="Yiii" typeface="Microsoft Yi Baiti"/>
+        <a:font script="Tibt" typeface="Microsoft Himalaya"/>
+        <a:font script="Thaa" typeface="MV Boli"/>
+        <a:font script="Deva" typeface="Mangal"/>
+        <a:font script="Telu" typeface="Gautami"/>
+        <a:font script="Taml" typeface="Latha"/>
+        <a:font script="Syrc" typeface="Estrangelo Edessa"/>
+        <a:font script="Orya" typeface="Kalinga"/>
+        <a:font script="Mlym" typeface="Kartika"/>
+        <a:font script="Laoo" typeface="DokChampa"/>
+        <a:font script="Sinh" typeface="Iskoola Pota"/>
+        <a:font script="Mong" typeface="Mongolian Baiti"/>
+        <a:font script="Viet" typeface="Times New Roman"/>
+        <a:font script="Uigh" typeface="Microsoft Uighur"/>
+        <a:font script="Geor" typeface="Sylfaen"/>
+        <a:font script="Armn" typeface="Arial"/>
+        <a:font script="Bugi" typeface="Leelawadee UI"/>
+        <a:font script="Bopo" typeface="Microsoft JhengHei"/>
+        <a:font script="Java" typeface="Javanese Text"/>
+        <a:font script="Lisu" typeface="Segoe UI"/>
+        <a:font script="Mymr" typeface="Myanmar Text"/>
+        <a:font script="Nkoo" typeface="Ebrima"/>
+        <a:font script="Olck" typeface="Nirmala UI"/>
+        <a:font script="Osma" typeface="Ebrima"/>
+        <a:font script="Phag" typeface="Phagspa"/>
+        <a:font script="Syrn" typeface="Estrangelo Edessa"/>
+        <a:font script="Syrj" typeface="Estrangelo Edessa"/>
+        <a:font script="Syre" typeface="Estrangelo Edessa"/>
+        <a:font script="Sora" typeface="Nirmala UI"/>
+        <a:font script="Tale" typeface="Microsoft Tai Le"/>
+        <a:font script="Talu" typeface="Microsoft New Tai Lue"/>
+        <a:font script="Tfng" typeface="Ebrima"/>
+      </a:majorFont>
+      <a:minorFont>
+        <a:latin typeface="Calibri" panose="020F0502020204030204"/>
+        <a:ea typeface=""/>
+        <a:cs typeface=""/>
+        <a:font script="Jpan" typeface="游ゴシック"/>
+        <a:font script="Hang" typeface="맑은 고딕"/>
+        <a:font script="Hans" typeface="等线"/>
+        <a:font script="Hant" typeface="新細明體"/>
+        <a:font script="Arab" typeface="Arial"/>
+        <a:font script="Hebr" typeface="Arial"/>
+        <a:font script="Thai" typeface="Cordia New"/>
+        <a:font script="Ethi" typeface="Nyala"/>
+        <a:font script="Beng" typeface="Vrinda"/>
+        <a:font script="Gujr" typeface="Shruti"/>
+        <a:font script="Khmr" typeface="DaunPenh"/>
+        <a:font script="Knda" typeface="Tunga"/>
+        <a:font script="Guru" typeface="Raavi"/>
+        <a:font script="Cans" typeface="Euphemia"/>
+        <a:font script="Cher" typeface="Plantagenet Cherokee"/>
+        <a:font script="Yiii" typeface="Microsoft Yi Baiti"/>
+        <a:font script="Tibt" typeface="Microsoft Himalaya"/>
+        <a:font script="Thaa" typeface="MV Boli"/>
+        <a:font script="Deva" typeface="Mangal"/>
+        <a:font script="Telu" typeface="Gautami"/>
+        <a:font script="Taml" typeface="Latha"/>
+        <a:font script="Syrc" typeface="Estrangelo Edessa"/>
+        <a:font script="Orya" typeface="Kalinga"/>
+        <a:font script="Mlym" typeface="Kartika"/>
+        <a:font script="Laoo" typeface="DokChampa"/>
+        <a:font script="Sinh" typeface="Iskoola Pota"/>
+        <a:font script="Mong" typeface="Mongolian Baiti"/>
+        <a:font script="Viet" typeface="Arial"/>
+        <a:font script="Uigh" typeface="Microsoft Uighur"/>
+        <a:font script="Geor" typeface="Sylfaen"/>
+        <a:font script="Armn" typeface="Arial"/>
+        <a:font script="Bugi" typeface="Leelawadee UI"/>
+        <a:font script="Bopo" typeface="Microsoft JhengHei"/>
+        <a:font script="Java" typeface="Javanese Text"/>
+        <a:font script="Lisu" typeface="Segoe UI"/>
+        <a:font script="Mymr" typeface="Myanmar Text"/>
+        <a:font script="Nkoo" typeface="Ebrima"/>
+        <a:font script="Olck" typeface="Nirmala UI"/>
+        <a:font script="Osma" typeface="Ebrima"/>
+        <a:font script="Phag" typeface="Phagspa"/>
+        <a:font script="Syrn" typeface="Estrangelo Edessa"/>
+        <a:font script="Syrj" typeface="Estrangelo Edessa"/>
+        <a:font script="Syre" typeface="Estrangelo Edessa"/>
+        <a:font script="Sora" typeface="Nirmala UI"/>
+        <a:font script="Tale" typeface="Microsoft Tai Le"/>
+        <a:font script="Talu" typeface="Microsoft New Tai Lue"/>
+        <a:font script="Tfng" typeface="Ebrima"/>
+      </a:minorFont>
+    </a:fontScheme>
+    <a:fmtScheme name="Office">
+      <a:fillStyleLst>
+        <a:solidFill>
+          <a:schemeClr val="phClr"/>
+        </a:solidFill>
+        <a:gradFill rotWithShape="1">
+          <a:gsLst>
+            <a:gs pos="0">
+              <a:schemeClr val="phClr">
+                <a:lumMod val="110000"/>
+                <a:satMod val="105000"/>
+                <a:tint val="67000"/>
+              </a:schemeClr>
+            </a:gs>
+            <a:gs pos="50000">
+              <a:schemeClr val="phClr">
+                <a:lumMod val="105000"/>
+                <a:satMod val="103000"/>
+                <a:tint val="73000"/>
+              </a:schemeClr>
+            </a:gs>
+            <a:gs pos="100000">
+              <a:schemeClr val="phClr">
+                <a:lumMod val="105000"/>
+                <a:satMod val="109000"/>
+                <a:tint val="81000"/>
+              </a:schemeClr>
+            </a:gs>
+          </a:gsLst>
+          <a:lin ang="5400000" scaled="0"/>
+        </a:gradFill>
+        <a:gradFill rotWithShape="1">
+          <a:gsLst>
+            <a:gs pos="0">
+              <a:schemeClr val="phClr">
+                <a:satMod val="103000"/>
+                <a:lumMod val="102000"/>
+                <a:tint val="94000"/>
+              </a:schemeClr>
+            </a:gs>
+            <a:gs pos="50000">
+              <a:schemeClr val="phClr">
+                <a:satMod val="110000"/>
+                <a:lumMod val="100000"/>
+                <a:shade val="100000"/>
+              </a:schemeClr>
+            </a:gs>
+            <a:gs pos="100000">
+              <a:schemeClr val="phClr">
+                <a:lumMod val="99000"/>
+                <a:satMod val="120000"/>
+                <a:shade val="78000"/>
+              </a:schemeClr>
+            </a:gs>
+          </a:gsLst>
+          <a:lin ang="5400000" scaled="0"/>
+        </a:gradFill>
+      </a:fillStyleLst>
+      <a:lnStyleLst>
+        <a:ln w="6350" cap="flat" cmpd="sng" algn="ctr">
+          <a:solidFill>
+            <a:schemeClr val="phClr"/>
+          </a:solidFill>
+          <a:prstDash val="solid"/>
+          <a:miter lim="800000"/>
+        </a:ln>
+        <a:ln w="12700" cap="flat" cmpd="sng" algn="ctr">
+          <a:solidFill>
+            <a:schemeClr val="phClr"/>
+          </a:solidFill>
+          <a:prstDash val="solid"/>
+          <a:miter lim="800000"/>
+        </a:ln>
+        <a:ln w="19050" cap="flat" cmpd="sng" algn="ctr">
+          <a:solidFill>
+            <a:schemeClr val="phClr"/>
+          </a:solidFill>
+          <a:prstDash val="solid"/>
+          <a:miter lim="800000"/>
+        </a:ln>
+      </a:lnStyleLst>
+      <a:effectStyleLst>
+        <a:effectStyle>
+          <a:effectLst/>
+        </a:effectStyle>
+        <a:effectStyle>
+          <a:effectLst/>
+        </a:effectStyle>
+        <a:effectStyle>
+          <a:effectLst>
+            <a:outerShdw blurRad="57150" dist="19050" dir="5400000" algn="ctr" rotWithShape="0">
+              <a:srgbClr val="000000">
+                <a:alpha val="63000"/>
+              </a:srgbClr>
+            </a:outerShdw>
+          </a:effectLst>
+        </a:effectStyle>
+      </a:effectStyleLst>
+      <a:bgFillStyleLst>
+        <a:solidFill>
+          <a:schemeClr val="phClr"/>
+        </a:solidFill>
+        <a:solidFill>
+          <a:schemeClr val="phClr">
+            <a:tint val="95000"/>
+            <a:satMod val="170000"/>
+          </a:schemeClr>
+        </a:solidFill>
+        <a:gradFill rotWithShape="1">
+          <a:gsLst>
+            <a:gs pos="0">
+              <a:schemeClr val="phClr">
+                <a:tint val="93000"/>
+                <a:satMod val="150000"/>
+                <a:shade val="98000"/>
+                <a:lumMod val="102000"/>
+              </a:schemeClr>
+            </a:gs>
+            <a:gs pos="50000">
+              <a:schemeClr val="phClr">
+                <a:tint val="98000"/>
+                <a:satMod val="130000"/>
+                <a:shade val="90000"/>
+                <a:lumMod val="103000"/>
+              </a:schemeClr>
+            </a:gs>
+            <a:gs pos="100000">
+              <a:schemeClr val="phClr">
+                <a:shade val="63000"/>
+                <a:satMod val="120000"/>
+              </a:schemeClr>
+            </a:gs>
+          </a:gsLst>
+          <a:lin ang="5400000" scaled="0"/>
+        </a:gradFill>
+      </a:bgFillStyleLst>
+    </a:fmtScheme>
+  </a:themeElements>
+  <a:objectDefaults/>
+  <a:extraClrSchemeLst/>
+  <a:extLst>
+    <a:ext uri="{05A4C25C-085E-4340-85A3-A5531E510DB2}">
+      <thm15:themeFamily xmlns:thm15="http://schemas.microsoft.com/office/thememl/2012/main" name="Office Theme" id="{62F939B6-93AF-4DB8-9C6B-D6C7DFDC589F}" vid="{4A3C46E8-61CC-4603-A589-7422A47A8E4A}"/>
+    </a:ext>
+  </a:extLst>
+</a:theme>
 </file>
</xml_diff>